<commit_message>
explore demographics and update presentation
</commit_message>
<xml_diff>
--- a/presentation/Scottish Household Survey Analysis.pptx
+++ b/presentation/Scottish Household Survey Analysis.pptx
@@ -5,7 +5,7 @@
     <p:sldMasterId id="2147483702" r:id="rId1"/>
   </p:sldMasterIdLst>
   <p:notesMasterIdLst>
-    <p:notesMasterId r:id="rId18"/>
+    <p:notesMasterId r:id="rId19"/>
   </p:notesMasterIdLst>
   <p:sldIdLst>
     <p:sldId id="256" r:id="rId2"/>
@@ -19,11 +19,12 @@
     <p:sldId id="265" r:id="rId10"/>
     <p:sldId id="271" r:id="rId11"/>
     <p:sldId id="260" r:id="rId12"/>
-    <p:sldId id="272" r:id="rId13"/>
-    <p:sldId id="267" r:id="rId14"/>
-    <p:sldId id="261" r:id="rId15"/>
-    <p:sldId id="262" r:id="rId16"/>
-    <p:sldId id="263" r:id="rId17"/>
+    <p:sldId id="273" r:id="rId13"/>
+    <p:sldId id="272" r:id="rId14"/>
+    <p:sldId id="267" r:id="rId15"/>
+    <p:sldId id="261" r:id="rId16"/>
+    <p:sldId id="262" r:id="rId17"/>
+    <p:sldId id="263" r:id="rId18"/>
   </p:sldIdLst>
   <p:sldSz cx="12192000" cy="6858000"/>
   <p:notesSz cx="6858000" cy="9144000"/>
@@ -212,7 +213,7 @@
           <a:p>
             <a:fld id="{536E0770-CD38-482F-9D21-D73B337B38FC}" type="datetimeFigureOut">
               <a:rPr lang="en-GB" smtClean="0"/>
-              <a:t>29/08/2023</a:t>
+              <a:t>30/08/2023</a:t>
             </a:fld>
             <a:endParaRPr lang="en-GB"/>
           </a:p>
@@ -524,18 +525,6 @@
           <a:bodyPr/>
           <a:lstStyle/>
           <a:p>
-            <a:r>
-              <a:rPr lang="en-GB" dirty="0"/>
-              <a:t>Measurements: percent, upper and lower confidence limits</a:t>
-            </a:r>
-          </a:p>
-          <a:p>
-            <a:r>
-              <a:rPr lang="en-GB" dirty="0"/>
-              <a:t>Years: 2013-2019</a:t>
-            </a:r>
-          </a:p>
-          <a:p>
             <a:endParaRPr lang="en-GB" dirty="0"/>
           </a:p>
         </p:txBody>
@@ -557,7 +546,7 @@
           <a:p>
             <a:fld id="{CCA02471-DE2F-4636-BAD6-5E9EBD7A50FC}" type="slidenum">
               <a:rPr lang="en-GB" smtClean="0"/>
-              <a:t>5</a:t>
+              <a:t>2</a:t>
             </a:fld>
             <a:endParaRPr lang="en-GB"/>
           </a:p>
@@ -566,7 +555,7 @@
     </p:spTree>
     <p:extLst>
       <p:ext uri="{BB962C8B-B14F-4D97-AF65-F5344CB8AC3E}">
-        <p14:creationId xmlns:p14="http://schemas.microsoft.com/office/powerpoint/2010/main" val="3232607098"/>
+        <p14:creationId xmlns:p14="http://schemas.microsoft.com/office/powerpoint/2010/main" val="3495438139"/>
       </p:ext>
     </p:extLst>
   </p:cSld>
@@ -622,32 +611,17 @@
           <a:p>
             <a:r>
               <a:rPr lang="en-GB" dirty="0"/>
-              <a:t>First made a function to easily visualise responses. </a:t>
+              <a:t>Measurements: percent, upper and lower confidence limits</a:t>
             </a:r>
           </a:p>
           <a:p>
             <a:r>
               <a:rPr lang="en-GB" dirty="0"/>
-              <a:t>Issues -&gt; </a:t>
-            </a:r>
-          </a:p>
-          <a:p>
-            <a:r>
-              <a:rPr lang="en-GB" dirty="0"/>
-              <a:t>only 2019, perhaps it changes over time?</a:t>
-            </a:r>
-          </a:p>
-          <a:p>
-            <a:r>
-              <a:rPr lang="en-GB" dirty="0"/>
-              <a:t>no “overall” score to see which group rated the highest</a:t>
-            </a:r>
-          </a:p>
-          <a:p>
-            <a:r>
-              <a:rPr lang="en-GB" dirty="0"/>
-              <a:t>Whole of Scotland, what if different areas differ?</a:t>
-            </a:r>
+              <a:t>Years: 2013-2019</a:t>
+            </a:r>
+          </a:p>
+          <a:p>
+            <a:endParaRPr lang="en-GB" dirty="0"/>
           </a:p>
         </p:txBody>
       </p:sp>
@@ -668,7 +642,7 @@
           <a:p>
             <a:fld id="{CCA02471-DE2F-4636-BAD6-5E9EBD7A50FC}" type="slidenum">
               <a:rPr lang="en-GB" smtClean="0"/>
-              <a:t>6</a:t>
+              <a:t>5</a:t>
             </a:fld>
             <a:endParaRPr lang="en-GB"/>
           </a:p>
@@ -677,7 +651,7 @@
     </p:spTree>
     <p:extLst>
       <p:ext uri="{BB962C8B-B14F-4D97-AF65-F5344CB8AC3E}">
-        <p14:creationId xmlns:p14="http://schemas.microsoft.com/office/powerpoint/2010/main" val="1962295463"/>
+        <p14:creationId xmlns:p14="http://schemas.microsoft.com/office/powerpoint/2010/main" val="3232607098"/>
       </p:ext>
     </p:extLst>
   </p:cSld>
@@ -733,7 +707,31 @@
           <a:p>
             <a:r>
               <a:rPr lang="en-GB" dirty="0"/>
-              <a:t>Access to greenspace does increase neighbourhood ratings AND community belonging.</a:t>
+              <a:t>First made a function to easily visualise responses. </a:t>
+            </a:r>
+          </a:p>
+          <a:p>
+            <a:r>
+              <a:rPr lang="en-GB" dirty="0"/>
+              <a:t>Issues -&gt; </a:t>
+            </a:r>
+          </a:p>
+          <a:p>
+            <a:r>
+              <a:rPr lang="en-GB" dirty="0"/>
+              <a:t>only 2019, perhaps it changes over time?</a:t>
+            </a:r>
+          </a:p>
+          <a:p>
+            <a:r>
+              <a:rPr lang="en-GB" dirty="0"/>
+              <a:t>no “overall” score to see which group rated the highest</a:t>
+            </a:r>
+          </a:p>
+          <a:p>
+            <a:r>
+              <a:rPr lang="en-GB" dirty="0"/>
+              <a:t>Whole of Scotland, what if different areas differ?</a:t>
             </a:r>
           </a:p>
         </p:txBody>
@@ -755,7 +753,7 @@
           <a:p>
             <a:fld id="{CCA02471-DE2F-4636-BAD6-5E9EBD7A50FC}" type="slidenum">
               <a:rPr lang="en-GB" smtClean="0"/>
-              <a:t>9</a:t>
+              <a:t>6</a:t>
             </a:fld>
             <a:endParaRPr lang="en-GB"/>
           </a:p>
@@ -764,7 +762,7 @@
     </p:spTree>
     <p:extLst>
       <p:ext uri="{BB962C8B-B14F-4D97-AF65-F5344CB8AC3E}">
-        <p14:creationId xmlns:p14="http://schemas.microsoft.com/office/powerpoint/2010/main" val="2435635944"/>
+        <p14:creationId xmlns:p14="http://schemas.microsoft.com/office/powerpoint/2010/main" val="1962295463"/>
       </p:ext>
     </p:extLst>
   </p:cSld>
@@ -818,6 +816,93 @@
           <a:bodyPr/>
           <a:lstStyle/>
           <a:p>
+            <a:r>
+              <a:rPr lang="en-GB" dirty="0"/>
+              <a:t>Access to greenspace does increase neighbourhood ratings AND community belonging.</a:t>
+            </a:r>
+          </a:p>
+        </p:txBody>
+      </p:sp>
+      <p:sp>
+        <p:nvSpPr>
+          <p:cNvPr id="4" name="Slide Number Placeholder 3"/>
+          <p:cNvSpPr>
+            <a:spLocks noGrp="1"/>
+          </p:cNvSpPr>
+          <p:nvPr>
+            <p:ph type="sldNum" sz="quarter" idx="5"/>
+          </p:nvPr>
+        </p:nvSpPr>
+        <p:spPr/>
+        <p:txBody>
+          <a:bodyPr/>
+          <a:lstStyle/>
+          <a:p>
+            <a:fld id="{CCA02471-DE2F-4636-BAD6-5E9EBD7A50FC}" type="slidenum">
+              <a:rPr lang="en-GB" smtClean="0"/>
+              <a:t>9</a:t>
+            </a:fld>
+            <a:endParaRPr lang="en-GB"/>
+          </a:p>
+        </p:txBody>
+      </p:sp>
+    </p:spTree>
+    <p:extLst>
+      <p:ext uri="{BB962C8B-B14F-4D97-AF65-F5344CB8AC3E}">
+        <p14:creationId xmlns:p14="http://schemas.microsoft.com/office/powerpoint/2010/main" val="2435635944"/>
+      </p:ext>
+    </p:extLst>
+  </p:cSld>
+  <p:clrMapOvr>
+    <a:masterClrMapping/>
+  </p:clrMapOvr>
+</p:notes>
+</file>
+
+<file path=ppt/notesSlides/notesSlide5.xml><?xml version="1.0" encoding="utf-8"?>
+<p:notes xmlns:a="http://schemas.openxmlformats.org/drawingml/2006/main" xmlns:r="http://schemas.openxmlformats.org/officeDocument/2006/relationships" xmlns:p="http://schemas.openxmlformats.org/presentationml/2006/main">
+  <p:cSld>
+    <p:spTree>
+      <p:nvGrpSpPr>
+        <p:cNvPr id="1" name=""/>
+        <p:cNvGrpSpPr/>
+        <p:nvPr/>
+      </p:nvGrpSpPr>
+      <p:grpSpPr>
+        <a:xfrm>
+          <a:off x="0" y="0"/>
+          <a:ext cx="0" cy="0"/>
+          <a:chOff x="0" y="0"/>
+          <a:chExt cx="0" cy="0"/>
+        </a:xfrm>
+      </p:grpSpPr>
+      <p:sp>
+        <p:nvSpPr>
+          <p:cNvPr id="2" name="Slide Image Placeholder 1"/>
+          <p:cNvSpPr>
+            <a:spLocks noGrp="1" noRot="1" noChangeAspect="1"/>
+          </p:cNvSpPr>
+          <p:nvPr>
+            <p:ph type="sldImg"/>
+          </p:nvPr>
+        </p:nvSpPr>
+        <p:spPr/>
+      </p:sp>
+      <p:sp>
+        <p:nvSpPr>
+          <p:cNvPr id="3" name="Notes Placeholder 2"/>
+          <p:cNvSpPr>
+            <a:spLocks noGrp="1"/>
+          </p:cNvSpPr>
+          <p:nvPr>
+            <p:ph type="body" idx="1"/>
+          </p:nvPr>
+        </p:nvSpPr>
+        <p:spPr/>
+        <p:txBody>
+          <a:bodyPr/>
+          <a:lstStyle/>
+          <a:p>
             <a:endParaRPr lang="en-GB" dirty="0"/>
           </a:p>
         </p:txBody>
@@ -849,6 +934,90 @@
     <p:extLst>
       <p:ext uri="{BB962C8B-B14F-4D97-AF65-F5344CB8AC3E}">
         <p14:creationId xmlns:p14="http://schemas.microsoft.com/office/powerpoint/2010/main" val="4012631341"/>
+      </p:ext>
+    </p:extLst>
+  </p:cSld>
+  <p:clrMapOvr>
+    <a:masterClrMapping/>
+  </p:clrMapOvr>
+</p:notes>
+</file>
+
+<file path=ppt/notesSlides/notesSlide6.xml><?xml version="1.0" encoding="utf-8"?>
+<p:notes xmlns:a="http://schemas.openxmlformats.org/drawingml/2006/main" xmlns:r="http://schemas.openxmlformats.org/officeDocument/2006/relationships" xmlns:p="http://schemas.openxmlformats.org/presentationml/2006/main">
+  <p:cSld>
+    <p:spTree>
+      <p:nvGrpSpPr>
+        <p:cNvPr id="1" name=""/>
+        <p:cNvGrpSpPr/>
+        <p:nvPr/>
+      </p:nvGrpSpPr>
+      <p:grpSpPr>
+        <a:xfrm>
+          <a:off x="0" y="0"/>
+          <a:ext cx="0" cy="0"/>
+          <a:chOff x="0" y="0"/>
+          <a:chExt cx="0" cy="0"/>
+        </a:xfrm>
+      </p:grpSpPr>
+      <p:sp>
+        <p:nvSpPr>
+          <p:cNvPr id="2" name="Slide Image Placeholder 1"/>
+          <p:cNvSpPr>
+            <a:spLocks noGrp="1" noRot="1" noChangeAspect="1"/>
+          </p:cNvSpPr>
+          <p:nvPr>
+            <p:ph type="sldImg"/>
+          </p:nvPr>
+        </p:nvSpPr>
+        <p:spPr/>
+      </p:sp>
+      <p:sp>
+        <p:nvSpPr>
+          <p:cNvPr id="3" name="Notes Placeholder 2"/>
+          <p:cNvSpPr>
+            <a:spLocks noGrp="1"/>
+          </p:cNvSpPr>
+          <p:nvPr>
+            <p:ph type="body" idx="1"/>
+          </p:nvPr>
+        </p:nvSpPr>
+        <p:spPr/>
+        <p:txBody>
+          <a:bodyPr/>
+          <a:lstStyle/>
+          <a:p>
+            <a:endParaRPr lang="en-GB" dirty="0"/>
+          </a:p>
+        </p:txBody>
+      </p:sp>
+      <p:sp>
+        <p:nvSpPr>
+          <p:cNvPr id="4" name="Slide Number Placeholder 3"/>
+          <p:cNvSpPr>
+            <a:spLocks noGrp="1"/>
+          </p:cNvSpPr>
+          <p:nvPr>
+            <p:ph type="sldNum" sz="quarter" idx="5"/>
+          </p:nvPr>
+        </p:nvSpPr>
+        <p:spPr/>
+        <p:txBody>
+          <a:bodyPr/>
+          <a:lstStyle/>
+          <a:p>
+            <a:fld id="{CCA02471-DE2F-4636-BAD6-5E9EBD7A50FC}" type="slidenum">
+              <a:rPr lang="en-GB" smtClean="0"/>
+              <a:t>12</a:t>
+            </a:fld>
+            <a:endParaRPr lang="en-GB"/>
+          </a:p>
+        </p:txBody>
+      </p:sp>
+    </p:spTree>
+    <p:extLst>
+      <p:ext uri="{BB962C8B-B14F-4D97-AF65-F5344CB8AC3E}">
+        <p14:creationId xmlns:p14="http://schemas.microsoft.com/office/powerpoint/2010/main" val="1165208387"/>
       </p:ext>
     </p:extLst>
   </p:cSld>
@@ -1084,7 +1253,7 @@
           <a:p>
             <a:fld id="{CE4A3503-C3D4-4F6D-81DE-5A90DE1C92CC}" type="datetime1">
               <a:rPr lang="en-GB" smtClean="0"/>
-              <a:t>29/08/2023</a:t>
+              <a:t>30/08/2023</a:t>
             </a:fld>
             <a:endParaRPr lang="en-GB"/>
           </a:p>
@@ -1292,7 +1461,7 @@
           <a:p>
             <a:fld id="{9B556DEB-F63B-462B-B8B2-64A2F3D66F96}" type="datetime1">
               <a:rPr lang="en-GB" smtClean="0"/>
-              <a:t>29/08/2023</a:t>
+              <a:t>30/08/2023</a:t>
             </a:fld>
             <a:endParaRPr lang="en-GB"/>
           </a:p>
@@ -1548,7 +1717,7 @@
           <a:p>
             <a:fld id="{317934FC-3264-40BE-99B1-E01E91DAF153}" type="datetime1">
               <a:rPr lang="en-GB" smtClean="0"/>
-              <a:t>29/08/2023</a:t>
+              <a:t>30/08/2023</a:t>
             </a:fld>
             <a:endParaRPr lang="en-GB"/>
           </a:p>
@@ -1718,7 +1887,7 @@
           <a:p>
             <a:fld id="{ABC06397-985D-4758-A1D0-6486593FC8BF}" type="datetime1">
               <a:rPr lang="en-GB" smtClean="0"/>
-              <a:t>29/08/2023</a:t>
+              <a:t>30/08/2023</a:t>
             </a:fld>
             <a:endParaRPr lang="en-GB"/>
           </a:p>
@@ -2061,7 +2230,7 @@
           <a:p>
             <a:fld id="{FDA121CD-E0E1-41C8-B9D8-6BE6EBE743C0}" type="datetime1">
               <a:rPr lang="en-GB" smtClean="0"/>
-              <a:t>29/08/2023</a:t>
+              <a:t>30/08/2023</a:t>
             </a:fld>
             <a:endParaRPr lang="en-GB"/>
           </a:p>
@@ -2336,7 +2505,7 @@
           <a:p>
             <a:fld id="{43126390-DA8B-428E-BB80-BA8AAF2CE3F7}" type="datetime1">
               <a:rPr lang="en-GB" smtClean="0"/>
-              <a:t>29/08/2023</a:t>
+              <a:t>30/08/2023</a:t>
             </a:fld>
             <a:endParaRPr lang="en-GB"/>
           </a:p>
@@ -2715,7 +2884,7 @@
           <a:p>
             <a:fld id="{14C83330-CD0E-4E23-9F18-4C49BBA2733B}" type="datetime1">
               <a:rPr lang="en-GB" smtClean="0"/>
-              <a:t>29/08/2023</a:t>
+              <a:t>30/08/2023</a:t>
             </a:fld>
             <a:endParaRPr lang="en-GB"/>
           </a:p>
@@ -2833,7 +3002,7 @@
           <a:p>
             <a:fld id="{B109A2A1-6BCB-42CB-82E1-6615D0BAD0F4}" type="datetime1">
               <a:rPr lang="en-GB" smtClean="0"/>
-              <a:t>29/08/2023</a:t>
+              <a:t>30/08/2023</a:t>
             </a:fld>
             <a:endParaRPr lang="en-GB"/>
           </a:p>
@@ -3004,7 +3173,7 @@
           <a:p>
             <a:fld id="{1CA09334-B197-46E3-84E0-287ABA66A5B3}" type="datetime1">
               <a:rPr lang="en-GB" smtClean="0"/>
-              <a:t>29/08/2023</a:t>
+              <a:t>30/08/2023</a:t>
             </a:fld>
             <a:endParaRPr lang="en-GB"/>
           </a:p>
@@ -3358,7 +3527,7 @@
           <a:p>
             <a:fld id="{AA2AE584-DAFC-4BDA-883B-E8CCDDC61B97}" type="datetime1">
               <a:rPr lang="en-GB" smtClean="0"/>
-              <a:t>29/08/2023</a:t>
+              <a:t>30/08/2023</a:t>
             </a:fld>
             <a:endParaRPr lang="en-GB"/>
           </a:p>
@@ -3735,7 +3904,7 @@
           <a:p>
             <a:fld id="{2B8D6311-9579-4B11-9452-2E0543F25B3F}" type="datetime1">
               <a:rPr lang="en-GB" smtClean="0"/>
-              <a:t>29/08/2023</a:t>
+              <a:t>30/08/2023</a:t>
             </a:fld>
             <a:endParaRPr lang="en-GB"/>
           </a:p>
@@ -4022,7 +4191,7 @@
           <a:p>
             <a:fld id="{F55059E5-08DE-414B-8414-11009CC039F5}" type="datetime1">
               <a:rPr lang="en-GB" smtClean="0"/>
-              <a:t>29/08/2023</a:t>
+              <a:t>30/08/2023</a:t>
             </a:fld>
             <a:endParaRPr lang="en-GB"/>
           </a:p>
@@ -7797,7 +7966,7 @@
                   <a:schemeClr val="bg1"/>
                 </a:solidFill>
               </a:rPr>
-              <a:t>2. Which areas have the best and worst ratings? Does this correlate with certain factors?</a:t>
+              <a:t>2. Which areas have the best and worst ratings? </a:t>
             </a:r>
           </a:p>
         </p:txBody>
@@ -7832,12 +8001,48 @@
           <a:chExt cx="0" cy="0"/>
         </a:xfrm>
       </p:grpSpPr>
+      <p:pic>
+        <p:nvPicPr>
+          <p:cNvPr id="28" name="Picture 27" descr="A graph of different colored bars&#10;&#10;Description automatically generated">
+            <a:extLst>
+              <a:ext uri="{FF2B5EF4-FFF2-40B4-BE49-F238E27FC236}">
+                <a16:creationId xmlns:a16="http://schemas.microsoft.com/office/drawing/2014/main" id="{055E2764-27C5-7053-5633-0AA91211F661}"/>
+              </a:ext>
+            </a:extLst>
+          </p:cNvPr>
+          <p:cNvPicPr>
+            <a:picLocks noChangeAspect="1"/>
+          </p:cNvPicPr>
+          <p:nvPr/>
+        </p:nvPicPr>
+        <p:blipFill>
+          <a:blip r:embed="rId3">
+            <a:extLst>
+              <a:ext uri="{28A0092B-C50C-407E-A947-70E740481C1C}">
+                <a14:useLocalDpi xmlns:a14="http://schemas.microsoft.com/office/drawing/2010/main" val="0"/>
+              </a:ext>
+            </a:extLst>
+          </a:blip>
+          <a:stretch>
+            <a:fillRect/>
+          </a:stretch>
+        </p:blipFill>
+        <p:spPr>
+          <a:xfrm>
+            <a:off x="6610499" y="33090"/>
+            <a:ext cx="5562619" cy="3431171"/>
+          </a:xfrm>
+          <a:prstGeom prst="rect">
+            <a:avLst/>
+          </a:prstGeom>
+        </p:spPr>
+      </p:pic>
       <p:sp>
         <p:nvSpPr>
           <p:cNvPr id="2" name="Title 1">
             <a:extLst>
               <a:ext uri="{FF2B5EF4-FFF2-40B4-BE49-F238E27FC236}">
-                <a16:creationId xmlns:a16="http://schemas.microsoft.com/office/drawing/2014/main" id="{7CA1BFFF-94DB-93E6-7FB7-FEC33B352698}"/>
+                <a16:creationId xmlns:a16="http://schemas.microsoft.com/office/drawing/2014/main" id="{2B132809-1B83-AFA6-BF0B-EAB265087462}"/>
               </a:ext>
             </a:extLst>
           </p:cNvPr>
@@ -7848,26 +8053,70 @@
             <p:ph type="title"/>
           </p:nvPr>
         </p:nvSpPr>
-        <p:spPr/>
+        <p:spPr>
+          <a:xfrm>
+            <a:off x="182454" y="286603"/>
+            <a:ext cx="4574021" cy="1785388"/>
+          </a:xfrm>
+          <a:solidFill>
+            <a:schemeClr val="bg1"/>
+          </a:solidFill>
+        </p:spPr>
         <p:txBody>
           <a:bodyPr>
-            <a:noAutofit/>
+            <a:normAutofit fontScale="90000"/>
           </a:bodyPr>
           <a:lstStyle/>
           <a:p>
             <a:r>
-              <a:rPr lang="en-GB" sz="6600" dirty="0"/>
-              <a:t>3. What factors influence neighbourhood ratings and community belonging?</a:t>
-            </a:r>
-          </a:p>
-        </p:txBody>
-      </p:sp>
-      <p:sp>
-        <p:nvSpPr>
-          <p:cNvPr id="6" name="Text Placeholder 5">
+              <a:rPr lang="en-GB" dirty="0"/>
+              <a:t>What makes these areas different?</a:t>
+            </a:r>
+          </a:p>
+        </p:txBody>
+      </p:sp>
+      <p:pic>
+        <p:nvPicPr>
+          <p:cNvPr id="26" name="Picture 25" descr="A graph of different colored bars&#10;&#10;Description automatically generated">
             <a:extLst>
               <a:ext uri="{FF2B5EF4-FFF2-40B4-BE49-F238E27FC236}">
-                <a16:creationId xmlns:a16="http://schemas.microsoft.com/office/drawing/2014/main" id="{5A5900C4-248D-2C7D-57CB-D90BBDD64228}"/>
+                <a16:creationId xmlns:a16="http://schemas.microsoft.com/office/drawing/2014/main" id="{BC5DFE76-D448-5A5D-5962-DFC362390360}"/>
+              </a:ext>
+            </a:extLst>
+          </p:cNvPr>
+          <p:cNvPicPr>
+            <a:picLocks noChangeAspect="1"/>
+          </p:cNvPicPr>
+          <p:nvPr/>
+        </p:nvPicPr>
+        <p:blipFill>
+          <a:blip r:embed="rId4">
+            <a:extLst>
+              <a:ext uri="{28A0092B-C50C-407E-A947-70E740481C1C}">
+                <a14:useLocalDpi xmlns:a14="http://schemas.microsoft.com/office/drawing/2010/main" val="0"/>
+              </a:ext>
+            </a:extLst>
+          </a:blip>
+          <a:stretch>
+            <a:fillRect/>
+          </a:stretch>
+        </p:blipFill>
+        <p:spPr>
+          <a:xfrm>
+            <a:off x="-32613" y="2809506"/>
+            <a:ext cx="6589829" cy="4064781"/>
+          </a:xfrm>
+          <a:prstGeom prst="rect">
+            <a:avLst/>
+          </a:prstGeom>
+        </p:spPr>
+      </p:pic>
+      <p:sp>
+        <p:nvSpPr>
+          <p:cNvPr id="4" name="Slide Number Placeholder 3">
+            <a:extLst>
+              <a:ext uri="{FF2B5EF4-FFF2-40B4-BE49-F238E27FC236}">
+                <a16:creationId xmlns:a16="http://schemas.microsoft.com/office/drawing/2014/main" id="{B0CB99B8-71F9-D278-FE34-8749978A3F38}"/>
               </a:ext>
             </a:extLst>
           </p:cNvPr>
@@ -7875,7 +8124,7 @@
             <a:spLocks noGrp="1"/>
           </p:cNvSpPr>
           <p:nvPr>
-            <p:ph type="body" idx="1"/>
+            <p:ph type="sldNum" sz="quarter" idx="12"/>
           </p:nvPr>
         </p:nvSpPr>
         <p:spPr/>
@@ -7883,46 +8132,725 @@
           <a:bodyPr/>
           <a:lstStyle/>
           <a:p>
-            <a:r>
-              <a:rPr lang="en-GB" dirty="0"/>
-              <a:t>Explored through R Shiny and Visualisations</a:t>
-            </a:r>
-          </a:p>
-        </p:txBody>
-      </p:sp>
-      <p:sp>
-        <p:nvSpPr>
-          <p:cNvPr id="7" name="Slide Number Placeholder 6">
+            <a:fld id="{1D85C9CE-5A10-4592-9F88-5339DD41B12B}" type="slidenum">
+              <a:rPr lang="en-GB" smtClean="0"/>
+              <a:t>12</a:t>
+            </a:fld>
+            <a:endParaRPr lang="en-GB"/>
+          </a:p>
+        </p:txBody>
+      </p:sp>
+      <p:sp>
+        <p:nvSpPr>
+          <p:cNvPr id="11" name="Oval 10">
             <a:extLst>
               <a:ext uri="{FF2B5EF4-FFF2-40B4-BE49-F238E27FC236}">
-                <a16:creationId xmlns:a16="http://schemas.microsoft.com/office/drawing/2014/main" id="{20A8038B-0A8B-024A-181D-090C8A1BAAB3}"/>
+                <a16:creationId xmlns:a16="http://schemas.microsoft.com/office/drawing/2014/main" id="{34BFD08E-E379-7857-AFA3-5F9AA362780D}"/>
               </a:ext>
             </a:extLst>
           </p:cNvPr>
-          <p:cNvSpPr>
-            <a:spLocks noGrp="1"/>
-          </p:cNvSpPr>
-          <p:nvPr>
-            <p:ph type="sldNum" sz="quarter" idx="12"/>
-          </p:nvPr>
-        </p:nvSpPr>
-        <p:spPr/>
-        <p:txBody>
-          <a:bodyPr/>
+          <p:cNvSpPr/>
+          <p:nvPr/>
+        </p:nvSpPr>
+        <p:spPr>
+          <a:xfrm>
+            <a:off x="2417473" y="4158320"/>
+            <a:ext cx="1103940" cy="1265103"/>
+          </a:xfrm>
+          <a:prstGeom prst="ellipse">
+            <a:avLst/>
+          </a:prstGeom>
+          <a:noFill/>
+          <a:ln w="38100">
+            <a:solidFill>
+              <a:srgbClr val="FF0000"/>
+            </a:solidFill>
+          </a:ln>
+        </p:spPr>
+        <p:style>
+          <a:lnRef idx="2">
+            <a:schemeClr val="accent1">
+              <a:shade val="15000"/>
+            </a:schemeClr>
+          </a:lnRef>
+          <a:fillRef idx="1">
+            <a:schemeClr val="accent1"/>
+          </a:fillRef>
+          <a:effectRef idx="0">
+            <a:schemeClr val="accent1"/>
+          </a:effectRef>
+          <a:fontRef idx="minor">
+            <a:schemeClr val="lt1"/>
+          </a:fontRef>
+        </p:style>
+        <p:txBody>
+          <a:bodyPr rtlCol="0" anchor="ctr"/>
           <a:lstStyle/>
           <a:p>
-            <a:fld id="{1D85C9CE-5A10-4592-9F88-5339DD41B12B}" type="slidenum">
-              <a:rPr lang="en-GB" sz="1600" smtClean="0"/>
-              <a:t>12</a:t>
-            </a:fld>
-            <a:endParaRPr lang="en-GB" sz="1600" dirty="0"/>
-          </a:p>
-        </p:txBody>
-      </p:sp>
+            <a:pPr algn="ctr"/>
+            <a:endParaRPr lang="en-GB"/>
+          </a:p>
+        </p:txBody>
+      </p:sp>
+      <p:sp>
+        <p:nvSpPr>
+          <p:cNvPr id="12" name="Oval 11">
+            <a:extLst>
+              <a:ext uri="{FF2B5EF4-FFF2-40B4-BE49-F238E27FC236}">
+                <a16:creationId xmlns:a16="http://schemas.microsoft.com/office/drawing/2014/main" id="{9B03796B-A1A7-AC1C-5985-D6C1A401944D}"/>
+              </a:ext>
+            </a:extLst>
+          </p:cNvPr>
+          <p:cNvSpPr/>
+          <p:nvPr/>
+        </p:nvSpPr>
+        <p:spPr>
+          <a:xfrm>
+            <a:off x="3661335" y="3922552"/>
+            <a:ext cx="998433" cy="1435084"/>
+          </a:xfrm>
+          <a:prstGeom prst="ellipse">
+            <a:avLst/>
+          </a:prstGeom>
+          <a:noFill/>
+          <a:ln w="38100">
+            <a:solidFill>
+              <a:srgbClr val="FF0000"/>
+            </a:solidFill>
+          </a:ln>
+        </p:spPr>
+        <p:style>
+          <a:lnRef idx="2">
+            <a:schemeClr val="accent1">
+              <a:shade val="15000"/>
+            </a:schemeClr>
+          </a:lnRef>
+          <a:fillRef idx="1">
+            <a:schemeClr val="accent1"/>
+          </a:fillRef>
+          <a:effectRef idx="0">
+            <a:schemeClr val="accent1"/>
+          </a:effectRef>
+          <a:fontRef idx="minor">
+            <a:schemeClr val="lt1"/>
+          </a:fontRef>
+        </p:style>
+        <p:txBody>
+          <a:bodyPr rtlCol="0" anchor="ctr"/>
+          <a:lstStyle/>
+          <a:p>
+            <a:pPr algn="ctr"/>
+            <a:endParaRPr lang="en-GB"/>
+          </a:p>
+        </p:txBody>
+      </p:sp>
+      <p:sp>
+        <p:nvSpPr>
+          <p:cNvPr id="13" name="Oval 12">
+            <a:extLst>
+              <a:ext uri="{FF2B5EF4-FFF2-40B4-BE49-F238E27FC236}">
+                <a16:creationId xmlns:a16="http://schemas.microsoft.com/office/drawing/2014/main" id="{DB93333D-DAD7-BD63-8A3D-939809AD7EE3}"/>
+              </a:ext>
+            </a:extLst>
+          </p:cNvPr>
+          <p:cNvSpPr/>
+          <p:nvPr/>
+        </p:nvSpPr>
+        <p:spPr>
+          <a:xfrm>
+            <a:off x="9774677" y="851521"/>
+            <a:ext cx="1254868" cy="2521622"/>
+          </a:xfrm>
+          <a:prstGeom prst="ellipse">
+            <a:avLst/>
+          </a:prstGeom>
+          <a:noFill/>
+          <a:ln w="38100">
+            <a:solidFill>
+              <a:srgbClr val="FF0000"/>
+            </a:solidFill>
+          </a:ln>
+        </p:spPr>
+        <p:style>
+          <a:lnRef idx="2">
+            <a:schemeClr val="accent1">
+              <a:shade val="15000"/>
+            </a:schemeClr>
+          </a:lnRef>
+          <a:fillRef idx="1">
+            <a:schemeClr val="accent1"/>
+          </a:fillRef>
+          <a:effectRef idx="0">
+            <a:schemeClr val="accent1"/>
+          </a:effectRef>
+          <a:fontRef idx="minor">
+            <a:schemeClr val="lt1"/>
+          </a:fontRef>
+        </p:style>
+        <p:txBody>
+          <a:bodyPr rtlCol="0" anchor="ctr"/>
+          <a:lstStyle/>
+          <a:p>
+            <a:pPr algn="ctr"/>
+            <a:endParaRPr lang="en-GB"/>
+          </a:p>
+        </p:txBody>
+      </p:sp>
+      <p:pic>
+        <p:nvPicPr>
+          <p:cNvPr id="32" name="Picture 31" descr="A graph of different colored bars&#10;&#10;Description automatically generated">
+            <a:extLst>
+              <a:ext uri="{FF2B5EF4-FFF2-40B4-BE49-F238E27FC236}">
+                <a16:creationId xmlns:a16="http://schemas.microsoft.com/office/drawing/2014/main" id="{C2746A1B-B83E-B027-079D-126E8D1AFCC0}"/>
+              </a:ext>
+            </a:extLst>
+          </p:cNvPr>
+          <p:cNvPicPr>
+            <a:picLocks noChangeAspect="1"/>
+          </p:cNvPicPr>
+          <p:nvPr/>
+        </p:nvPicPr>
+        <p:blipFill>
+          <a:blip r:embed="rId5">
+            <a:extLst>
+              <a:ext uri="{28A0092B-C50C-407E-A947-70E740481C1C}">
+                <a14:useLocalDpi xmlns:a14="http://schemas.microsoft.com/office/drawing/2010/main" val="0"/>
+              </a:ext>
+            </a:extLst>
+          </a:blip>
+          <a:stretch>
+            <a:fillRect/>
+          </a:stretch>
+        </p:blipFill>
+        <p:spPr>
+          <a:xfrm>
+            <a:off x="6503934" y="3365737"/>
+            <a:ext cx="5688066" cy="3508550"/>
+          </a:xfrm>
+          <a:prstGeom prst="rect">
+            <a:avLst/>
+          </a:prstGeom>
+        </p:spPr>
+      </p:pic>
+      <p:sp>
+        <p:nvSpPr>
+          <p:cNvPr id="14" name="Oval 13">
+            <a:extLst>
+              <a:ext uri="{FF2B5EF4-FFF2-40B4-BE49-F238E27FC236}">
+                <a16:creationId xmlns:a16="http://schemas.microsoft.com/office/drawing/2014/main" id="{3C6697A7-73F5-D7AD-D5EE-FFD2A3BE671B}"/>
+              </a:ext>
+            </a:extLst>
+          </p:cNvPr>
+          <p:cNvSpPr/>
+          <p:nvPr/>
+        </p:nvSpPr>
+        <p:spPr>
+          <a:xfrm>
+            <a:off x="7344282" y="906836"/>
+            <a:ext cx="1254868" cy="2330310"/>
+          </a:xfrm>
+          <a:prstGeom prst="ellipse">
+            <a:avLst/>
+          </a:prstGeom>
+          <a:noFill/>
+          <a:ln w="38100">
+            <a:solidFill>
+              <a:srgbClr val="FF0000"/>
+            </a:solidFill>
+          </a:ln>
+        </p:spPr>
+        <p:style>
+          <a:lnRef idx="2">
+            <a:schemeClr val="accent1">
+              <a:shade val="15000"/>
+            </a:schemeClr>
+          </a:lnRef>
+          <a:fillRef idx="1">
+            <a:schemeClr val="accent1"/>
+          </a:fillRef>
+          <a:effectRef idx="0">
+            <a:schemeClr val="accent1"/>
+          </a:effectRef>
+          <a:fontRef idx="minor">
+            <a:schemeClr val="lt1"/>
+          </a:fontRef>
+        </p:style>
+        <p:txBody>
+          <a:bodyPr rtlCol="0" anchor="ctr"/>
+          <a:lstStyle/>
+          <a:p>
+            <a:pPr algn="ctr"/>
+            <a:endParaRPr lang="en-GB"/>
+          </a:p>
+        </p:txBody>
+      </p:sp>
+      <p:sp>
+        <p:nvSpPr>
+          <p:cNvPr id="15" name="Oval 14">
+            <a:extLst>
+              <a:ext uri="{FF2B5EF4-FFF2-40B4-BE49-F238E27FC236}">
+                <a16:creationId xmlns:a16="http://schemas.microsoft.com/office/drawing/2014/main" id="{3081ADC7-FF51-835B-2A01-63ABEEF0D04B}"/>
+              </a:ext>
+            </a:extLst>
+          </p:cNvPr>
+          <p:cNvSpPr/>
+          <p:nvPr/>
+        </p:nvSpPr>
+        <p:spPr>
+          <a:xfrm>
+            <a:off x="7104859" y="4944464"/>
+            <a:ext cx="1600113" cy="1828801"/>
+          </a:xfrm>
+          <a:prstGeom prst="ellipse">
+            <a:avLst/>
+          </a:prstGeom>
+          <a:noFill/>
+          <a:ln w="38100">
+            <a:solidFill>
+              <a:srgbClr val="FF0000"/>
+            </a:solidFill>
+          </a:ln>
+        </p:spPr>
+        <p:style>
+          <a:lnRef idx="2">
+            <a:schemeClr val="accent1">
+              <a:shade val="15000"/>
+            </a:schemeClr>
+          </a:lnRef>
+          <a:fillRef idx="1">
+            <a:schemeClr val="accent1"/>
+          </a:fillRef>
+          <a:effectRef idx="0">
+            <a:schemeClr val="accent1"/>
+          </a:effectRef>
+          <a:fontRef idx="minor">
+            <a:schemeClr val="lt1"/>
+          </a:fontRef>
+        </p:style>
+        <p:txBody>
+          <a:bodyPr rtlCol="0" anchor="ctr"/>
+          <a:lstStyle/>
+          <a:p>
+            <a:pPr algn="ctr"/>
+            <a:endParaRPr lang="en-GB"/>
+          </a:p>
+        </p:txBody>
+      </p:sp>
+      <p:sp>
+        <p:nvSpPr>
+          <p:cNvPr id="16" name="Oval 15">
+            <a:extLst>
+              <a:ext uri="{FF2B5EF4-FFF2-40B4-BE49-F238E27FC236}">
+                <a16:creationId xmlns:a16="http://schemas.microsoft.com/office/drawing/2014/main" id="{DAC74A28-22D9-6CB0-D794-E6DE9D6DA9C7}"/>
+              </a:ext>
+            </a:extLst>
+          </p:cNvPr>
+          <p:cNvSpPr/>
+          <p:nvPr/>
+        </p:nvSpPr>
+        <p:spPr>
+          <a:xfrm>
+            <a:off x="10457234" y="4640094"/>
+            <a:ext cx="1715884" cy="2123208"/>
+          </a:xfrm>
+          <a:prstGeom prst="ellipse">
+            <a:avLst/>
+          </a:prstGeom>
+          <a:noFill/>
+          <a:ln w="38100">
+            <a:solidFill>
+              <a:srgbClr val="FF0000"/>
+            </a:solidFill>
+          </a:ln>
+        </p:spPr>
+        <p:style>
+          <a:lnRef idx="2">
+            <a:schemeClr val="accent1">
+              <a:shade val="15000"/>
+            </a:schemeClr>
+          </a:lnRef>
+          <a:fillRef idx="1">
+            <a:schemeClr val="accent1"/>
+          </a:fillRef>
+          <a:effectRef idx="0">
+            <a:schemeClr val="accent1"/>
+          </a:effectRef>
+          <a:fontRef idx="minor">
+            <a:schemeClr val="lt1"/>
+          </a:fontRef>
+        </p:style>
+        <p:txBody>
+          <a:bodyPr rtlCol="0" anchor="ctr"/>
+          <a:lstStyle/>
+          <a:p>
+            <a:pPr algn="ctr"/>
+            <a:endParaRPr lang="en-GB"/>
+          </a:p>
+        </p:txBody>
+      </p:sp>
+      <p:sp>
+        <p:nvSpPr>
+          <p:cNvPr id="17" name="Arrow: Up 16">
+            <a:extLst>
+              <a:ext uri="{FF2B5EF4-FFF2-40B4-BE49-F238E27FC236}">
+                <a16:creationId xmlns:a16="http://schemas.microsoft.com/office/drawing/2014/main" id="{63E350C5-1881-623C-D7FF-C0473AEAEEC3}"/>
+              </a:ext>
+            </a:extLst>
+          </p:cNvPr>
+          <p:cNvSpPr/>
+          <p:nvPr/>
+        </p:nvSpPr>
+        <p:spPr>
+          <a:xfrm>
+            <a:off x="2773466" y="4700446"/>
+            <a:ext cx="376075" cy="473598"/>
+          </a:xfrm>
+          <a:prstGeom prst="upArrow">
+            <a:avLst/>
+          </a:prstGeom>
+          <a:solidFill>
+            <a:srgbClr val="FF0000"/>
+          </a:solidFill>
+          <a:ln>
+            <a:solidFill>
+              <a:schemeClr val="tx1"/>
+            </a:solidFill>
+          </a:ln>
+        </p:spPr>
+        <p:style>
+          <a:lnRef idx="2">
+            <a:schemeClr val="accent1">
+              <a:shade val="15000"/>
+            </a:schemeClr>
+          </a:lnRef>
+          <a:fillRef idx="1">
+            <a:schemeClr val="accent1"/>
+          </a:fillRef>
+          <a:effectRef idx="0">
+            <a:schemeClr val="accent1"/>
+          </a:effectRef>
+          <a:fontRef idx="minor">
+            <a:schemeClr val="lt1"/>
+          </a:fontRef>
+        </p:style>
+        <p:txBody>
+          <a:bodyPr rtlCol="0" anchor="ctr"/>
+          <a:lstStyle/>
+          <a:p>
+            <a:pPr algn="ctr"/>
+            <a:endParaRPr lang="en-GB"/>
+          </a:p>
+        </p:txBody>
+      </p:sp>
+      <p:sp>
+        <p:nvSpPr>
+          <p:cNvPr id="18" name="Arrow: Up 17">
+            <a:extLst>
+              <a:ext uri="{FF2B5EF4-FFF2-40B4-BE49-F238E27FC236}">
+                <a16:creationId xmlns:a16="http://schemas.microsoft.com/office/drawing/2014/main" id="{A97471F7-DE1E-FBC9-CD7B-A4D89EBCC915}"/>
+              </a:ext>
+            </a:extLst>
+          </p:cNvPr>
+          <p:cNvSpPr/>
+          <p:nvPr/>
+        </p:nvSpPr>
+        <p:spPr>
+          <a:xfrm>
+            <a:off x="3925252" y="4646415"/>
+            <a:ext cx="470597" cy="473597"/>
+          </a:xfrm>
+          <a:prstGeom prst="upArrow">
+            <a:avLst/>
+          </a:prstGeom>
+          <a:solidFill>
+            <a:srgbClr val="FF0000"/>
+          </a:solidFill>
+          <a:ln>
+            <a:solidFill>
+              <a:schemeClr val="tx1"/>
+            </a:solidFill>
+          </a:ln>
+        </p:spPr>
+        <p:style>
+          <a:lnRef idx="2">
+            <a:schemeClr val="accent1">
+              <a:shade val="15000"/>
+            </a:schemeClr>
+          </a:lnRef>
+          <a:fillRef idx="1">
+            <a:schemeClr val="accent1"/>
+          </a:fillRef>
+          <a:effectRef idx="0">
+            <a:schemeClr val="accent1"/>
+          </a:effectRef>
+          <a:fontRef idx="minor">
+            <a:schemeClr val="lt1"/>
+          </a:fontRef>
+        </p:style>
+        <p:txBody>
+          <a:bodyPr rtlCol="0" anchor="ctr"/>
+          <a:lstStyle/>
+          <a:p>
+            <a:pPr algn="ctr"/>
+            <a:endParaRPr lang="en-GB"/>
+          </a:p>
+        </p:txBody>
+      </p:sp>
+      <p:sp>
+        <p:nvSpPr>
+          <p:cNvPr id="19" name="Arrow: Up 18">
+            <a:extLst>
+              <a:ext uri="{FF2B5EF4-FFF2-40B4-BE49-F238E27FC236}">
+                <a16:creationId xmlns:a16="http://schemas.microsoft.com/office/drawing/2014/main" id="{01A5E436-202F-DA42-1943-F2D7C2E3148B}"/>
+              </a:ext>
+            </a:extLst>
+          </p:cNvPr>
+          <p:cNvSpPr/>
+          <p:nvPr/>
+        </p:nvSpPr>
+        <p:spPr>
+          <a:xfrm rot="10800000">
+            <a:off x="7671724" y="2112332"/>
+            <a:ext cx="445511" cy="488624"/>
+          </a:xfrm>
+          <a:prstGeom prst="upArrow">
+            <a:avLst/>
+          </a:prstGeom>
+          <a:solidFill>
+            <a:srgbClr val="FF0000"/>
+          </a:solidFill>
+          <a:ln>
+            <a:solidFill>
+              <a:schemeClr val="tx1"/>
+            </a:solidFill>
+          </a:ln>
+        </p:spPr>
+        <p:style>
+          <a:lnRef idx="2">
+            <a:schemeClr val="accent1">
+              <a:shade val="15000"/>
+            </a:schemeClr>
+          </a:lnRef>
+          <a:fillRef idx="1">
+            <a:schemeClr val="accent1"/>
+          </a:fillRef>
+          <a:effectRef idx="0">
+            <a:schemeClr val="accent1"/>
+          </a:effectRef>
+          <a:fontRef idx="minor">
+            <a:schemeClr val="lt1"/>
+          </a:fontRef>
+        </p:style>
+        <p:txBody>
+          <a:bodyPr rtlCol="0" anchor="ctr"/>
+          <a:lstStyle/>
+          <a:p>
+            <a:pPr algn="ctr"/>
+            <a:endParaRPr lang="en-GB"/>
+          </a:p>
+        </p:txBody>
+      </p:sp>
+      <p:sp>
+        <p:nvSpPr>
+          <p:cNvPr id="20" name="Arrow: Up 19">
+            <a:extLst>
+              <a:ext uri="{FF2B5EF4-FFF2-40B4-BE49-F238E27FC236}">
+                <a16:creationId xmlns:a16="http://schemas.microsoft.com/office/drawing/2014/main" id="{28DB523E-2EE7-D013-674A-0086FBC247C6}"/>
+              </a:ext>
+            </a:extLst>
+          </p:cNvPr>
+          <p:cNvSpPr/>
+          <p:nvPr/>
+        </p:nvSpPr>
+        <p:spPr>
+          <a:xfrm>
+            <a:off x="10224375" y="2078308"/>
+            <a:ext cx="465717" cy="484623"/>
+          </a:xfrm>
+          <a:prstGeom prst="upArrow">
+            <a:avLst/>
+          </a:prstGeom>
+          <a:solidFill>
+            <a:srgbClr val="FF0000"/>
+          </a:solidFill>
+          <a:ln>
+            <a:solidFill>
+              <a:schemeClr val="tx1"/>
+            </a:solidFill>
+          </a:ln>
+        </p:spPr>
+        <p:style>
+          <a:lnRef idx="2">
+            <a:schemeClr val="accent1">
+              <a:shade val="15000"/>
+            </a:schemeClr>
+          </a:lnRef>
+          <a:fillRef idx="1">
+            <a:schemeClr val="accent1"/>
+          </a:fillRef>
+          <a:effectRef idx="0">
+            <a:schemeClr val="accent1"/>
+          </a:effectRef>
+          <a:fontRef idx="minor">
+            <a:schemeClr val="lt1"/>
+          </a:fontRef>
+        </p:style>
+        <p:txBody>
+          <a:bodyPr rtlCol="0" anchor="ctr"/>
+          <a:lstStyle/>
+          <a:p>
+            <a:pPr algn="ctr"/>
+            <a:endParaRPr lang="en-GB"/>
+          </a:p>
+        </p:txBody>
+      </p:sp>
+      <p:sp>
+        <p:nvSpPr>
+          <p:cNvPr id="21" name="Arrow: Up 20">
+            <a:extLst>
+              <a:ext uri="{FF2B5EF4-FFF2-40B4-BE49-F238E27FC236}">
+                <a16:creationId xmlns:a16="http://schemas.microsoft.com/office/drawing/2014/main" id="{4AB575B9-74DB-44CE-41D2-2BB354DFF671}"/>
+              </a:ext>
+            </a:extLst>
+          </p:cNvPr>
+          <p:cNvSpPr/>
+          <p:nvPr/>
+        </p:nvSpPr>
+        <p:spPr>
+          <a:xfrm rot="16200000">
+            <a:off x="7756440" y="5343357"/>
+            <a:ext cx="339962" cy="568593"/>
+          </a:xfrm>
+          <a:prstGeom prst="upArrow">
+            <a:avLst/>
+          </a:prstGeom>
+          <a:solidFill>
+            <a:srgbClr val="FF0000"/>
+          </a:solidFill>
+          <a:ln>
+            <a:solidFill>
+              <a:schemeClr val="tx1"/>
+            </a:solidFill>
+          </a:ln>
+        </p:spPr>
+        <p:style>
+          <a:lnRef idx="2">
+            <a:schemeClr val="accent1">
+              <a:shade val="15000"/>
+            </a:schemeClr>
+          </a:lnRef>
+          <a:fillRef idx="1">
+            <a:schemeClr val="accent1"/>
+          </a:fillRef>
+          <a:effectRef idx="0">
+            <a:schemeClr val="accent1"/>
+          </a:effectRef>
+          <a:fontRef idx="minor">
+            <a:schemeClr val="lt1"/>
+          </a:fontRef>
+        </p:style>
+        <p:txBody>
+          <a:bodyPr rtlCol="0" anchor="ctr"/>
+          <a:lstStyle/>
+          <a:p>
+            <a:pPr algn="ctr"/>
+            <a:endParaRPr lang="en-GB"/>
+          </a:p>
+        </p:txBody>
+      </p:sp>
+      <p:sp>
+        <p:nvSpPr>
+          <p:cNvPr id="22" name="Arrow: Up 21">
+            <a:extLst>
+              <a:ext uri="{FF2B5EF4-FFF2-40B4-BE49-F238E27FC236}">
+                <a16:creationId xmlns:a16="http://schemas.microsoft.com/office/drawing/2014/main" id="{FB1931F8-7813-57FC-8257-C97260B6EB49}"/>
+              </a:ext>
+            </a:extLst>
+          </p:cNvPr>
+          <p:cNvSpPr/>
+          <p:nvPr/>
+        </p:nvSpPr>
+        <p:spPr>
+          <a:xfrm rot="5400000">
+            <a:off x="11042501" y="5309108"/>
+            <a:ext cx="339962" cy="568593"/>
+          </a:xfrm>
+          <a:prstGeom prst="upArrow">
+            <a:avLst/>
+          </a:prstGeom>
+          <a:solidFill>
+            <a:srgbClr val="FF0000"/>
+          </a:solidFill>
+          <a:ln>
+            <a:solidFill>
+              <a:schemeClr val="tx1"/>
+            </a:solidFill>
+          </a:ln>
+        </p:spPr>
+        <p:style>
+          <a:lnRef idx="2">
+            <a:schemeClr val="accent1">
+              <a:shade val="15000"/>
+            </a:schemeClr>
+          </a:lnRef>
+          <a:fillRef idx="1">
+            <a:schemeClr val="accent1"/>
+          </a:fillRef>
+          <a:effectRef idx="0">
+            <a:schemeClr val="accent1"/>
+          </a:effectRef>
+          <a:fontRef idx="minor">
+            <a:schemeClr val="lt1"/>
+          </a:fontRef>
+        </p:style>
+        <p:txBody>
+          <a:bodyPr rtlCol="0" anchor="ctr"/>
+          <a:lstStyle/>
+          <a:p>
+            <a:pPr algn="ctr"/>
+            <a:endParaRPr lang="en-GB"/>
+          </a:p>
+        </p:txBody>
+      </p:sp>
+      <p:pic>
+        <p:nvPicPr>
+          <p:cNvPr id="24" name="Picture 23" descr="A graph of different colored bars&#10;&#10;Description automatically generated">
+            <a:extLst>
+              <a:ext uri="{FF2B5EF4-FFF2-40B4-BE49-F238E27FC236}">
+                <a16:creationId xmlns:a16="http://schemas.microsoft.com/office/drawing/2014/main" id="{E5E4FEEC-7A00-C383-884C-583243615235}"/>
+              </a:ext>
+            </a:extLst>
+          </p:cNvPr>
+          <p:cNvPicPr>
+            <a:picLocks noChangeAspect="1"/>
+          </p:cNvPicPr>
+          <p:nvPr/>
+        </p:nvPicPr>
+        <p:blipFill rotWithShape="1">
+          <a:blip r:embed="rId6">
+            <a:extLst>
+              <a:ext uri="{28A0092B-C50C-407E-A947-70E740481C1C}">
+                <a14:useLocalDpi xmlns:a14="http://schemas.microsoft.com/office/drawing/2010/main" val="0"/>
+              </a:ext>
+            </a:extLst>
+          </a:blip>
+          <a:srcRect l="62426" t="27770"/>
+          <a:stretch/>
+        </p:blipFill>
+        <p:spPr>
+          <a:xfrm>
+            <a:off x="4738820" y="489744"/>
+            <a:ext cx="1819311" cy="2157299"/>
+          </a:xfrm>
+          <a:prstGeom prst="rect">
+            <a:avLst/>
+          </a:prstGeom>
+        </p:spPr>
+      </p:pic>
     </p:spTree>
     <p:extLst>
       <p:ext uri="{BB962C8B-B14F-4D97-AF65-F5344CB8AC3E}">
-        <p14:creationId xmlns:p14="http://schemas.microsoft.com/office/powerpoint/2010/main" val="4194583123"/>
+        <p14:creationId xmlns:p14="http://schemas.microsoft.com/office/powerpoint/2010/main" val="2570577750"/>
       </p:ext>
     </p:extLst>
   </p:cSld>
@@ -7954,6 +8882,123 @@
           <p:cNvPr id="2" name="Title 1">
             <a:extLst>
               <a:ext uri="{FF2B5EF4-FFF2-40B4-BE49-F238E27FC236}">
+                <a16:creationId xmlns:a16="http://schemas.microsoft.com/office/drawing/2014/main" id="{7CA1BFFF-94DB-93E6-7FB7-FEC33B352698}"/>
+              </a:ext>
+            </a:extLst>
+          </p:cNvPr>
+          <p:cNvSpPr>
+            <a:spLocks noGrp="1"/>
+          </p:cNvSpPr>
+          <p:nvPr>
+            <p:ph type="title"/>
+          </p:nvPr>
+        </p:nvSpPr>
+        <p:spPr/>
+        <p:txBody>
+          <a:bodyPr>
+            <a:noAutofit/>
+          </a:bodyPr>
+          <a:lstStyle/>
+          <a:p>
+            <a:r>
+              <a:rPr lang="en-GB" sz="6600" dirty="0"/>
+              <a:t>3. What factors influence neighbourhood ratings and community belonging?</a:t>
+            </a:r>
+          </a:p>
+        </p:txBody>
+      </p:sp>
+      <p:sp>
+        <p:nvSpPr>
+          <p:cNvPr id="6" name="Text Placeholder 5">
+            <a:extLst>
+              <a:ext uri="{FF2B5EF4-FFF2-40B4-BE49-F238E27FC236}">
+                <a16:creationId xmlns:a16="http://schemas.microsoft.com/office/drawing/2014/main" id="{5A5900C4-248D-2C7D-57CB-D90BBDD64228}"/>
+              </a:ext>
+            </a:extLst>
+          </p:cNvPr>
+          <p:cNvSpPr>
+            <a:spLocks noGrp="1"/>
+          </p:cNvSpPr>
+          <p:nvPr>
+            <p:ph type="body" idx="1"/>
+          </p:nvPr>
+        </p:nvSpPr>
+        <p:spPr/>
+        <p:txBody>
+          <a:bodyPr/>
+          <a:lstStyle/>
+          <a:p>
+            <a:r>
+              <a:rPr lang="en-GB" dirty="0"/>
+              <a:t>Explored through R Shiny and Visualisations</a:t>
+            </a:r>
+          </a:p>
+        </p:txBody>
+      </p:sp>
+      <p:sp>
+        <p:nvSpPr>
+          <p:cNvPr id="7" name="Slide Number Placeholder 6">
+            <a:extLst>
+              <a:ext uri="{FF2B5EF4-FFF2-40B4-BE49-F238E27FC236}">
+                <a16:creationId xmlns:a16="http://schemas.microsoft.com/office/drawing/2014/main" id="{20A8038B-0A8B-024A-181D-090C8A1BAAB3}"/>
+              </a:ext>
+            </a:extLst>
+          </p:cNvPr>
+          <p:cNvSpPr>
+            <a:spLocks noGrp="1"/>
+          </p:cNvSpPr>
+          <p:nvPr>
+            <p:ph type="sldNum" sz="quarter" idx="12"/>
+          </p:nvPr>
+        </p:nvSpPr>
+        <p:spPr/>
+        <p:txBody>
+          <a:bodyPr/>
+          <a:lstStyle/>
+          <a:p>
+            <a:fld id="{1D85C9CE-5A10-4592-9F88-5339DD41B12B}" type="slidenum">
+              <a:rPr lang="en-GB" sz="1600" smtClean="0"/>
+              <a:t>13</a:t>
+            </a:fld>
+            <a:endParaRPr lang="en-GB" sz="1600" dirty="0"/>
+          </a:p>
+        </p:txBody>
+      </p:sp>
+    </p:spTree>
+    <p:extLst>
+      <p:ext uri="{BB962C8B-B14F-4D97-AF65-F5344CB8AC3E}">
+        <p14:creationId xmlns:p14="http://schemas.microsoft.com/office/powerpoint/2010/main" val="4194583123"/>
+      </p:ext>
+    </p:extLst>
+  </p:cSld>
+  <p:clrMapOvr>
+    <a:masterClrMapping/>
+  </p:clrMapOvr>
+</p:sld>
+</file>
+
+<file path=ppt/slides/slide14.xml><?xml version="1.0" encoding="utf-8"?>
+<p:sld xmlns:a="http://schemas.openxmlformats.org/drawingml/2006/main" xmlns:r="http://schemas.openxmlformats.org/officeDocument/2006/relationships" xmlns:p="http://schemas.openxmlformats.org/presentationml/2006/main">
+  <p:cSld>
+    <p:spTree>
+      <p:nvGrpSpPr>
+        <p:cNvPr id="1" name=""/>
+        <p:cNvGrpSpPr/>
+        <p:nvPr/>
+      </p:nvGrpSpPr>
+      <p:grpSpPr>
+        <a:xfrm>
+          <a:off x="0" y="0"/>
+          <a:ext cx="0" cy="0"/>
+          <a:chOff x="0" y="0"/>
+          <a:chExt cx="0" cy="0"/>
+        </a:xfrm>
+      </p:grpSpPr>
+      <p:sp>
+        <p:nvSpPr>
+          <p:cNvPr id="2" name="Title 1">
+            <a:extLst>
+              <a:ext uri="{FF2B5EF4-FFF2-40B4-BE49-F238E27FC236}">
                 <a16:creationId xmlns:a16="http://schemas.microsoft.com/office/drawing/2014/main" id="{A9AB9D93-FD83-D3E0-5219-54BAACFD49D7}"/>
               </a:ext>
             </a:extLst>
@@ -8018,7 +9063,7 @@
             </a:pPr>
             <a:r>
               <a:rPr lang="en-GB" dirty="0"/>
-              <a:t>Pensioners</a:t>
+              <a:t>Rural areas</a:t>
             </a:r>
           </a:p>
           <a:p>
@@ -8048,7 +9093,7 @@
             </a:pPr>
             <a:r>
               <a:rPr lang="en-GB" dirty="0"/>
-              <a:t>White</a:t>
+              <a:t>Homeowners</a:t>
             </a:r>
           </a:p>
           <a:p>
@@ -8058,7 +9103,7 @@
             </a:pPr>
             <a:r>
               <a:rPr lang="en-GB" dirty="0"/>
-              <a:t>Homeowners</a:t>
+              <a:t>Pensioners</a:t>
             </a:r>
           </a:p>
           <a:p>
@@ -8068,7 +9113,7 @@
             </a:pPr>
             <a:r>
               <a:rPr lang="en-GB" dirty="0"/>
-              <a:t>Rural areas</a:t>
+              <a:t>White</a:t>
             </a:r>
           </a:p>
         </p:txBody>
@@ -8089,7 +9134,7 @@
         </p:nvSpPr>
         <p:spPr>
           <a:xfrm>
-            <a:off x="6649816" y="1944057"/>
+            <a:off x="6315821" y="1944057"/>
             <a:ext cx="5130992" cy="4023360"/>
           </a:xfrm>
           <a:prstGeom prst="rect">
@@ -8363,7 +9408,7 @@
             </a:pPr>
             <a:r>
               <a:rPr lang="en-GB" dirty="0"/>
-              <a:t>Adult only households</a:t>
+              <a:t>Urban areas</a:t>
             </a:r>
           </a:p>
           <a:p>
@@ -8393,7 +9438,7 @@
             </a:pPr>
             <a:r>
               <a:rPr lang="en-GB" dirty="0"/>
-              <a:t>Non-white ethnicity</a:t>
+              <a:t>Private or social rented</a:t>
             </a:r>
           </a:p>
           <a:p>
@@ -8403,7 +9448,7 @@
             </a:pPr>
             <a:r>
               <a:rPr lang="en-GB" dirty="0"/>
-              <a:t>Private or social rented</a:t>
+              <a:t>Adult only households</a:t>
             </a:r>
           </a:p>
           <a:p>
@@ -8413,7 +9458,7 @@
             </a:pPr>
             <a:r>
               <a:rPr lang="en-GB" dirty="0"/>
-              <a:t>Urban areas</a:t>
+              <a:t>Non-white ethnicity</a:t>
             </a:r>
           </a:p>
         </p:txBody>
@@ -8441,7 +9486,7 @@
           <a:p>
             <a:fld id="{1D85C9CE-5A10-4592-9F88-5339DD41B12B}" type="slidenum">
               <a:rPr lang="en-GB" sz="1600" smtClean="0"/>
-              <a:t>13</a:t>
+              <a:t>14</a:t>
             </a:fld>
             <a:endParaRPr lang="en-GB" sz="1600"/>
           </a:p>
@@ -8509,253 +9554,45 @@
           </a:p>
         </p:txBody>
       </p:sp>
-    </p:spTree>
-    <p:extLst>
-      <p:ext uri="{BB962C8B-B14F-4D97-AF65-F5344CB8AC3E}">
-        <p14:creationId xmlns:p14="http://schemas.microsoft.com/office/powerpoint/2010/main" val="1033130111"/>
-      </p:ext>
-    </p:extLst>
-  </p:cSld>
-  <p:clrMapOvr>
-    <a:masterClrMapping/>
-  </p:clrMapOvr>
-</p:sld>
-</file>
-
-<file path=ppt/slides/slide14.xml><?xml version="1.0" encoding="utf-8"?>
-<p:sld xmlns:a="http://schemas.openxmlformats.org/drawingml/2006/main" xmlns:r="http://schemas.openxmlformats.org/officeDocument/2006/relationships" xmlns:p="http://schemas.openxmlformats.org/presentationml/2006/main">
-  <p:cSld>
-    <p:spTree>
-      <p:nvGrpSpPr>
-        <p:cNvPr id="1" name=""/>
-        <p:cNvGrpSpPr/>
-        <p:nvPr/>
-      </p:nvGrpSpPr>
-      <p:grpSpPr>
-        <a:xfrm>
-          <a:off x="0" y="0"/>
-          <a:ext cx="0" cy="0"/>
-          <a:chOff x="0" y="0"/>
-          <a:chExt cx="0" cy="0"/>
-        </a:xfrm>
-      </p:grpSpPr>
-      <p:sp>
-        <p:nvSpPr>
-          <p:cNvPr id="2" name="Title 1">
+      <p:sp>
+        <p:nvSpPr>
+          <p:cNvPr id="7" name="TextBox 6">
             <a:extLst>
               <a:ext uri="{FF2B5EF4-FFF2-40B4-BE49-F238E27FC236}">
-                <a16:creationId xmlns:a16="http://schemas.microsoft.com/office/drawing/2014/main" id="{A7F99953-ACBC-C4C1-2E80-2223E4D820FA}"/>
+                <a16:creationId xmlns:a16="http://schemas.microsoft.com/office/drawing/2014/main" id="{0CC02FCD-4469-BE2B-EF19-4BC28A6ECBE8}"/>
               </a:ext>
             </a:extLst>
           </p:cNvPr>
-          <p:cNvSpPr>
-            <a:spLocks noGrp="1"/>
-          </p:cNvSpPr>
-          <p:nvPr>
-            <p:ph type="title"/>
-          </p:nvPr>
-        </p:nvSpPr>
-        <p:spPr/>
-        <p:txBody>
-          <a:bodyPr/>
-          <a:lstStyle/>
-          <a:p>
-            <a:r>
-              <a:rPr lang="en-GB" dirty="0"/>
-              <a:t>Action</a:t>
-            </a:r>
-          </a:p>
-        </p:txBody>
-      </p:sp>
-      <p:sp>
-        <p:nvSpPr>
-          <p:cNvPr id="3" name="Content Placeholder 2">
-            <a:extLst>
-              <a:ext uri="{FF2B5EF4-FFF2-40B4-BE49-F238E27FC236}">
-                <a16:creationId xmlns:a16="http://schemas.microsoft.com/office/drawing/2014/main" id="{DD0D4818-A64A-187A-4964-E9BA2DC4BB09}"/>
-              </a:ext>
-            </a:extLst>
-          </p:cNvPr>
-          <p:cNvSpPr>
-            <a:spLocks noGrp="1"/>
-          </p:cNvSpPr>
-          <p:nvPr>
-            <p:ph idx="1"/>
-          </p:nvPr>
-        </p:nvSpPr>
-        <p:spPr/>
-        <p:txBody>
-          <a:bodyPr/>
-          <a:lstStyle/>
-          <a:p>
-            <a:pPr>
-              <a:buFont typeface="Wingdings" panose="05000000000000000000" pitchFamily="2" charset="2"/>
-              <a:buChar char="§"/>
-            </a:pPr>
-            <a:r>
-              <a:rPr lang="en-GB" dirty="0"/>
-              <a:t>Increasing access to greenspace where possible may help improve neighbourhoods and communities</a:t>
-            </a:r>
-          </a:p>
-          <a:p>
-            <a:pPr>
-              <a:buFont typeface="Wingdings" panose="05000000000000000000" pitchFamily="2" charset="2"/>
-              <a:buChar char="§"/>
-            </a:pPr>
-            <a:r>
-              <a:rPr lang="en-GB" dirty="0"/>
-              <a:t>Further study could look at what the highest rated areas are doing well, particularly compared to the lowest rated areas</a:t>
-            </a:r>
-          </a:p>
-          <a:p>
-            <a:pPr>
-              <a:buFont typeface="Wingdings" panose="05000000000000000000" pitchFamily="2" charset="2"/>
-              <a:buChar char="§"/>
-            </a:pPr>
-            <a:r>
-              <a:rPr lang="en-GB" dirty="0"/>
-              <a:t>Further investigation should also look at how neighbourhoods and communities can be improved for:</a:t>
-            </a:r>
-          </a:p>
-          <a:p>
-            <a:pPr lvl="1">
-              <a:buFont typeface="Wingdings" panose="05000000000000000000" pitchFamily="2" charset="2"/>
-              <a:buChar char="§"/>
-            </a:pPr>
-            <a:r>
-              <a:rPr lang="en-GB" dirty="0"/>
-              <a:t>Areas of deprivation (SIMD)</a:t>
-            </a:r>
-          </a:p>
-          <a:p>
-            <a:pPr lvl="1">
-              <a:buFont typeface="Wingdings" panose="05000000000000000000" pitchFamily="2" charset="2"/>
-              <a:buChar char="§"/>
-            </a:pPr>
-            <a:r>
-              <a:rPr lang="en-GB" dirty="0"/>
-              <a:t>Urban areas</a:t>
-            </a:r>
-          </a:p>
-          <a:p>
-            <a:pPr lvl="1">
-              <a:buFont typeface="Wingdings" panose="05000000000000000000" pitchFamily="2" charset="2"/>
-              <a:buChar char="§"/>
-            </a:pPr>
-            <a:r>
-              <a:rPr lang="en-GB" dirty="0"/>
-              <a:t>Those renting (private or social)</a:t>
-            </a:r>
-          </a:p>
-          <a:p>
-            <a:pPr lvl="1">
-              <a:buFont typeface="Wingdings" panose="05000000000000000000" pitchFamily="2" charset="2"/>
-              <a:buChar char="§"/>
-            </a:pPr>
-            <a:r>
-              <a:rPr lang="en-GB" dirty="0"/>
-              <a:t>Families </a:t>
-            </a:r>
-          </a:p>
-          <a:p>
-            <a:pPr lvl="1">
-              <a:buFont typeface="Wingdings" panose="05000000000000000000" pitchFamily="2" charset="2"/>
-              <a:buChar char="§"/>
-            </a:pPr>
-            <a:r>
-              <a:rPr lang="en-GB" dirty="0"/>
-              <a:t>Non-white ethnicities </a:t>
-            </a:r>
-          </a:p>
-        </p:txBody>
-      </p:sp>
-      <p:sp>
-        <p:nvSpPr>
-          <p:cNvPr id="4" name="Slide Number Placeholder 3">
-            <a:extLst>
-              <a:ext uri="{FF2B5EF4-FFF2-40B4-BE49-F238E27FC236}">
-                <a16:creationId xmlns:a16="http://schemas.microsoft.com/office/drawing/2014/main" id="{3188C2FD-921E-1A76-83A6-6DB74140B7F8}"/>
-              </a:ext>
-            </a:extLst>
-          </p:cNvPr>
-          <p:cNvSpPr>
-            <a:spLocks noGrp="1"/>
-          </p:cNvSpPr>
-          <p:nvPr>
-            <p:ph type="sldNum" sz="quarter" idx="12"/>
-          </p:nvPr>
-        </p:nvSpPr>
-        <p:spPr/>
-        <p:txBody>
-          <a:bodyPr/>
-          <a:lstStyle/>
-          <a:p>
-            <a:fld id="{1D85C9CE-5A10-4592-9F88-5339DD41B12B}" type="slidenum">
-              <a:rPr lang="en-GB" sz="1600" smtClean="0"/>
-              <a:t>14</a:t>
-            </a:fld>
-            <a:endParaRPr lang="en-GB" sz="1600"/>
-          </a:p>
-        </p:txBody>
-      </p:sp>
-      <p:sp>
-        <p:nvSpPr>
-          <p:cNvPr id="5" name="Title 1">
-            <a:extLst>
-              <a:ext uri="{FF2B5EF4-FFF2-40B4-BE49-F238E27FC236}">
-                <a16:creationId xmlns:a16="http://schemas.microsoft.com/office/drawing/2014/main" id="{B4EE3B6A-54FA-009D-4A30-62AD28988C67}"/>
-              </a:ext>
-            </a:extLst>
-          </p:cNvPr>
-          <p:cNvSpPr txBox="1">
-            <a:spLocks/>
-          </p:cNvSpPr>
+          <p:cNvSpPr txBox="1"/>
           <p:nvPr/>
         </p:nvSpPr>
         <p:spPr>
           <a:xfrm>
-            <a:off x="1916382" y="6430297"/>
-            <a:ext cx="8359236" cy="427703"/>
+            <a:off x="603115" y="5651770"/>
+            <a:ext cx="10491605" cy="369332"/>
           </a:xfrm>
           <a:prstGeom prst="rect">
             <a:avLst/>
           </a:prstGeom>
+          <a:noFill/>
         </p:spPr>
         <p:txBody>
-          <a:bodyPr vert="horz" lIns="91440" tIns="45720" rIns="91440" bIns="45720" rtlCol="0" anchor="ctr">
-            <a:noAutofit/>
+          <a:bodyPr wrap="square" rtlCol="0">
+            <a:spAutoFit/>
           </a:bodyPr>
-          <a:lstStyle>
-            <a:lvl1pPr algn="l" defTabSz="914400" rtl="0" eaLnBrk="1" latinLnBrk="0" hangingPunct="1">
-              <a:lnSpc>
-                <a:spcPct val="85000"/>
-              </a:lnSpc>
-              <a:spcBef>
-                <a:spcPct val="0"/>
-              </a:spcBef>
-              <a:buNone/>
-              <a:defRPr sz="4800" kern="1200" spc="-50" baseline="0">
+          <a:lstStyle/>
+          <a:p>
+            <a:pPr algn="ctr"/>
+            <a:r>
+              <a:rPr lang="en-GB" b="1" dirty="0">
                 <a:solidFill>
                   <a:schemeClr val="tx1">
                     <a:lumMod val="75000"/>
                     <a:lumOff val="25000"/>
                   </a:schemeClr>
                 </a:solidFill>
-                <a:latin typeface="+mj-lt"/>
-                <a:ea typeface="+mj-ea"/>
-                <a:cs typeface="+mj-cs"/>
-              </a:defRPr>
-            </a:lvl1pPr>
-          </a:lstStyle>
-          <a:p>
-            <a:pPr algn="ctr"/>
-            <a:r>
-              <a:rPr lang="en-GB" sz="1800" dirty="0">
-                <a:solidFill>
-                  <a:schemeClr val="bg1"/>
-                </a:solidFill>
               </a:rPr>
-              <a:t>Conclusion</a:t>
+              <a:t>Summary: Should target urban areas, with low SIMD and high proportions of social renting</a:t>
             </a:r>
           </a:p>
         </p:txBody>
@@ -8763,7 +9600,7 @@
     </p:spTree>
     <p:extLst>
       <p:ext uri="{BB962C8B-B14F-4D97-AF65-F5344CB8AC3E}">
-        <p14:creationId xmlns:p14="http://schemas.microsoft.com/office/powerpoint/2010/main" val="1142641468"/>
+        <p14:creationId xmlns:p14="http://schemas.microsoft.com/office/powerpoint/2010/main" val="1033130111"/>
       </p:ext>
     </p:extLst>
   </p:cSld>
@@ -8795,7 +9632,7 @@
           <p:cNvPr id="2" name="Title 1">
             <a:extLst>
               <a:ext uri="{FF2B5EF4-FFF2-40B4-BE49-F238E27FC236}">
-                <a16:creationId xmlns:a16="http://schemas.microsoft.com/office/drawing/2014/main" id="{B15ABF18-765C-A8B0-5118-DD518D0ADD97}"/>
+                <a16:creationId xmlns:a16="http://schemas.microsoft.com/office/drawing/2014/main" id="{A7F99953-ACBC-C4C1-2E80-2223E4D820FA}"/>
               </a:ext>
             </a:extLst>
           </p:cNvPr>
@@ -8813,7 +9650,7 @@
           <a:p>
             <a:r>
               <a:rPr lang="en-GB" dirty="0"/>
-              <a:t>Further Ideas</a:t>
+              <a:t>Action</a:t>
             </a:r>
           </a:p>
         </p:txBody>
@@ -8823,7 +9660,7 @@
           <p:cNvPr id="3" name="Content Placeholder 2">
             <a:extLst>
               <a:ext uri="{FF2B5EF4-FFF2-40B4-BE49-F238E27FC236}">
-                <a16:creationId xmlns:a16="http://schemas.microsoft.com/office/drawing/2014/main" id="{05718D89-BDEF-7FBC-C3B6-648178F04DA5}"/>
+                <a16:creationId xmlns:a16="http://schemas.microsoft.com/office/drawing/2014/main" id="{DD0D4818-A64A-187A-4964-E9BA2DC4BB09}"/>
               </a:ext>
             </a:extLst>
           </p:cNvPr>
@@ -8836,93 +9673,87 @@
         </p:nvSpPr>
         <p:spPr/>
         <p:txBody>
-          <a:bodyPr>
-            <a:normAutofit fontScale="92500"/>
-          </a:bodyPr>
+          <a:bodyPr/>
           <a:lstStyle/>
           <a:p>
             <a:pPr>
-              <a:lnSpc>
-                <a:spcPct val="220000"/>
-              </a:lnSpc>
               <a:buFont typeface="Wingdings" panose="05000000000000000000" pitchFamily="2" charset="2"/>
               <a:buChar char="§"/>
             </a:pPr>
             <a:r>
               <a:rPr lang="en-GB" dirty="0"/>
-              <a:t>Modelling to identify key factors and the impact they have</a:t>
+              <a:t>Increasing access to greenspace where possible may help improve neighbourhoods and communities</a:t>
             </a:r>
           </a:p>
           <a:p>
             <a:pPr>
-              <a:lnSpc>
-                <a:spcPct val="220000"/>
-              </a:lnSpc>
               <a:buFont typeface="Wingdings" panose="05000000000000000000" pitchFamily="2" charset="2"/>
               <a:buChar char="§"/>
             </a:pPr>
             <a:r>
               <a:rPr lang="en-GB" dirty="0"/>
-              <a:t>Explore raw survey data to identify other things that impact the ratings</a:t>
+              <a:t>Further study could look at what the highest rated areas are doing well, particularly compared to the lowest rated areas</a:t>
             </a:r>
           </a:p>
           <a:p>
             <a:pPr>
-              <a:lnSpc>
-                <a:spcPct val="220000"/>
-              </a:lnSpc>
               <a:buFont typeface="Wingdings" panose="05000000000000000000" pitchFamily="2" charset="2"/>
               <a:buChar char="§"/>
             </a:pPr>
             <a:r>
               <a:rPr lang="en-GB" dirty="0"/>
-              <a:t>Explore the demographics of the highest and lowest rated areas</a:t>
-            </a:r>
-          </a:p>
-          <a:p>
-            <a:pPr>
-              <a:lnSpc>
-                <a:spcPct val="220000"/>
-              </a:lnSpc>
+              <a:t>Further investigation should also look at how neighbourhoods and communities can be improved for:</a:t>
+            </a:r>
+          </a:p>
+          <a:p>
+            <a:pPr lvl="1">
               <a:buFont typeface="Wingdings" panose="05000000000000000000" pitchFamily="2" charset="2"/>
               <a:buChar char="§"/>
             </a:pPr>
             <a:r>
               <a:rPr lang="en-GB" dirty="0"/>
-              <a:t>Understand the sample sizes to better understand the results</a:t>
-            </a:r>
-          </a:p>
-          <a:p>
-            <a:pPr>
-              <a:lnSpc>
-                <a:spcPct val="220000"/>
-              </a:lnSpc>
+              <a:t>Areas of deprivation (SIMD)</a:t>
+            </a:r>
+          </a:p>
+          <a:p>
+            <a:pPr lvl="1">
               <a:buFont typeface="Wingdings" panose="05000000000000000000" pitchFamily="2" charset="2"/>
               <a:buChar char="§"/>
             </a:pPr>
             <a:r>
               <a:rPr lang="en-GB" dirty="0"/>
-              <a:t>Explore the confidence limits and what they tell us about the data</a:t>
-            </a:r>
-          </a:p>
-          <a:p>
-            <a:pPr>
-              <a:lnSpc>
-                <a:spcPct val="220000"/>
-              </a:lnSpc>
+              <a:t>Urban areas</a:t>
+            </a:r>
+          </a:p>
+          <a:p>
+            <a:pPr lvl="1">
               <a:buFont typeface="Wingdings" panose="05000000000000000000" pitchFamily="2" charset="2"/>
               <a:buChar char="§"/>
             </a:pPr>
-            <a:endParaRPr lang="en-GB" dirty="0"/>
-          </a:p>
-          <a:p>
-            <a:pPr marL="0" indent="0">
-              <a:lnSpc>
-                <a:spcPct val="220000"/>
-              </a:lnSpc>
-              <a:buNone/>
+            <a:r>
+              <a:rPr lang="en-GB" dirty="0"/>
+              <a:t>Those renting (private or social)</a:t>
+            </a:r>
+          </a:p>
+          <a:p>
+            <a:pPr lvl="1">
+              <a:buFont typeface="Wingdings" panose="05000000000000000000" pitchFamily="2" charset="2"/>
+              <a:buChar char="§"/>
             </a:pPr>
-            <a:endParaRPr lang="en-GB" dirty="0"/>
+            <a:r>
+              <a:rPr lang="en-GB" dirty="0"/>
+              <a:t>Families </a:t>
+            </a:r>
+          </a:p>
+          <a:p>
+            <a:pPr lvl="1">
+              <a:buFont typeface="Wingdings" panose="05000000000000000000" pitchFamily="2" charset="2"/>
+              <a:buChar char="§"/>
+            </a:pPr>
+            <a:r>
+              <a:rPr lang="en-GB" dirty="0"/>
+              <a:t>Non-white ethnicities </a:t>
+            </a:r>
           </a:p>
         </p:txBody>
       </p:sp>
@@ -8931,7 +9762,7 @@
           <p:cNvPr id="4" name="Slide Number Placeholder 3">
             <a:extLst>
               <a:ext uri="{FF2B5EF4-FFF2-40B4-BE49-F238E27FC236}">
-                <a16:creationId xmlns:a16="http://schemas.microsoft.com/office/drawing/2014/main" id="{0ECCDBEF-FF91-61A1-A9B7-4D2234A3733A}"/>
+                <a16:creationId xmlns:a16="http://schemas.microsoft.com/office/drawing/2014/main" id="{3188C2FD-921E-1A76-83A6-6DB74140B7F8}"/>
               </a:ext>
             </a:extLst>
           </p:cNvPr>
@@ -8951,7 +9782,7 @@
               <a:rPr lang="en-GB" sz="1600" smtClean="0"/>
               <a:t>15</a:t>
             </a:fld>
-            <a:endParaRPr lang="en-GB" sz="1600" dirty="0"/>
+            <a:endParaRPr lang="en-GB" sz="1600"/>
           </a:p>
         </p:txBody>
       </p:sp>
@@ -8960,7 +9791,7 @@
           <p:cNvPr id="5" name="Title 1">
             <a:extLst>
               <a:ext uri="{FF2B5EF4-FFF2-40B4-BE49-F238E27FC236}">
-                <a16:creationId xmlns:a16="http://schemas.microsoft.com/office/drawing/2014/main" id="{9C6824AB-C8AC-D81D-D26A-2212CAA2B984}"/>
+                <a16:creationId xmlns:a16="http://schemas.microsoft.com/office/drawing/2014/main" id="{B4EE3B6A-54FA-009D-4A30-62AD28988C67}"/>
               </a:ext>
             </a:extLst>
           </p:cNvPr>
@@ -9020,7 +9851,7 @@
     </p:spTree>
     <p:extLst>
       <p:ext uri="{BB962C8B-B14F-4D97-AF65-F5344CB8AC3E}">
-        <p14:creationId xmlns:p14="http://schemas.microsoft.com/office/powerpoint/2010/main" val="2446263786"/>
+        <p14:creationId xmlns:p14="http://schemas.microsoft.com/office/powerpoint/2010/main" val="1142641468"/>
       </p:ext>
     </p:extLst>
   </p:cSld>
@@ -9052,6 +9883,263 @@
           <p:cNvPr id="2" name="Title 1">
             <a:extLst>
               <a:ext uri="{FF2B5EF4-FFF2-40B4-BE49-F238E27FC236}">
+                <a16:creationId xmlns:a16="http://schemas.microsoft.com/office/drawing/2014/main" id="{B15ABF18-765C-A8B0-5118-DD518D0ADD97}"/>
+              </a:ext>
+            </a:extLst>
+          </p:cNvPr>
+          <p:cNvSpPr>
+            <a:spLocks noGrp="1"/>
+          </p:cNvSpPr>
+          <p:nvPr>
+            <p:ph type="title"/>
+          </p:nvPr>
+        </p:nvSpPr>
+        <p:spPr/>
+        <p:txBody>
+          <a:bodyPr/>
+          <a:lstStyle/>
+          <a:p>
+            <a:r>
+              <a:rPr lang="en-GB" dirty="0"/>
+              <a:t>Further Ideas</a:t>
+            </a:r>
+          </a:p>
+        </p:txBody>
+      </p:sp>
+      <p:sp>
+        <p:nvSpPr>
+          <p:cNvPr id="3" name="Content Placeholder 2">
+            <a:extLst>
+              <a:ext uri="{FF2B5EF4-FFF2-40B4-BE49-F238E27FC236}">
+                <a16:creationId xmlns:a16="http://schemas.microsoft.com/office/drawing/2014/main" id="{05718D89-BDEF-7FBC-C3B6-648178F04DA5}"/>
+              </a:ext>
+            </a:extLst>
+          </p:cNvPr>
+          <p:cNvSpPr>
+            <a:spLocks noGrp="1"/>
+          </p:cNvSpPr>
+          <p:nvPr>
+            <p:ph idx="1"/>
+          </p:nvPr>
+        </p:nvSpPr>
+        <p:spPr/>
+        <p:txBody>
+          <a:bodyPr>
+            <a:normAutofit fontScale="92500"/>
+          </a:bodyPr>
+          <a:lstStyle/>
+          <a:p>
+            <a:pPr>
+              <a:lnSpc>
+                <a:spcPct val="220000"/>
+              </a:lnSpc>
+              <a:buFont typeface="Wingdings" panose="05000000000000000000" pitchFamily="2" charset="2"/>
+              <a:buChar char="§"/>
+            </a:pPr>
+            <a:r>
+              <a:rPr lang="en-GB" dirty="0"/>
+              <a:t>Modelling to identify key factors and the impact they have</a:t>
+            </a:r>
+          </a:p>
+          <a:p>
+            <a:pPr>
+              <a:lnSpc>
+                <a:spcPct val="220000"/>
+              </a:lnSpc>
+              <a:buFont typeface="Wingdings" panose="05000000000000000000" pitchFamily="2" charset="2"/>
+              <a:buChar char="§"/>
+            </a:pPr>
+            <a:r>
+              <a:rPr lang="en-GB" dirty="0"/>
+              <a:t>Explore raw survey data to identify other things that impact the ratings</a:t>
+            </a:r>
+          </a:p>
+          <a:p>
+            <a:pPr>
+              <a:lnSpc>
+                <a:spcPct val="220000"/>
+              </a:lnSpc>
+              <a:buFont typeface="Wingdings" panose="05000000000000000000" pitchFamily="2" charset="2"/>
+              <a:buChar char="§"/>
+            </a:pPr>
+            <a:r>
+              <a:rPr lang="en-GB" dirty="0"/>
+              <a:t>Explore the demographics of the highest and lowest rated areas</a:t>
+            </a:r>
+          </a:p>
+          <a:p>
+            <a:pPr>
+              <a:lnSpc>
+                <a:spcPct val="220000"/>
+              </a:lnSpc>
+              <a:buFont typeface="Wingdings" panose="05000000000000000000" pitchFamily="2" charset="2"/>
+              <a:buChar char="§"/>
+            </a:pPr>
+            <a:r>
+              <a:rPr lang="en-GB" dirty="0"/>
+              <a:t>Understand the sample sizes to better understand the results</a:t>
+            </a:r>
+          </a:p>
+          <a:p>
+            <a:pPr>
+              <a:lnSpc>
+                <a:spcPct val="220000"/>
+              </a:lnSpc>
+              <a:buFont typeface="Wingdings" panose="05000000000000000000" pitchFamily="2" charset="2"/>
+              <a:buChar char="§"/>
+            </a:pPr>
+            <a:r>
+              <a:rPr lang="en-GB" dirty="0"/>
+              <a:t>Explore the confidence limits and what they tell us about the data</a:t>
+            </a:r>
+          </a:p>
+          <a:p>
+            <a:pPr>
+              <a:lnSpc>
+                <a:spcPct val="220000"/>
+              </a:lnSpc>
+              <a:buFont typeface="Wingdings" panose="05000000000000000000" pitchFamily="2" charset="2"/>
+              <a:buChar char="§"/>
+            </a:pPr>
+            <a:endParaRPr lang="en-GB" dirty="0"/>
+          </a:p>
+          <a:p>
+            <a:pPr marL="0" indent="0">
+              <a:lnSpc>
+                <a:spcPct val="220000"/>
+              </a:lnSpc>
+              <a:buNone/>
+            </a:pPr>
+            <a:endParaRPr lang="en-GB" dirty="0"/>
+          </a:p>
+        </p:txBody>
+      </p:sp>
+      <p:sp>
+        <p:nvSpPr>
+          <p:cNvPr id="4" name="Slide Number Placeholder 3">
+            <a:extLst>
+              <a:ext uri="{FF2B5EF4-FFF2-40B4-BE49-F238E27FC236}">
+                <a16:creationId xmlns:a16="http://schemas.microsoft.com/office/drawing/2014/main" id="{0ECCDBEF-FF91-61A1-A9B7-4D2234A3733A}"/>
+              </a:ext>
+            </a:extLst>
+          </p:cNvPr>
+          <p:cNvSpPr>
+            <a:spLocks noGrp="1"/>
+          </p:cNvSpPr>
+          <p:nvPr>
+            <p:ph type="sldNum" sz="quarter" idx="12"/>
+          </p:nvPr>
+        </p:nvSpPr>
+        <p:spPr/>
+        <p:txBody>
+          <a:bodyPr/>
+          <a:lstStyle/>
+          <a:p>
+            <a:fld id="{1D85C9CE-5A10-4592-9F88-5339DD41B12B}" type="slidenum">
+              <a:rPr lang="en-GB" sz="1600" smtClean="0"/>
+              <a:t>16</a:t>
+            </a:fld>
+            <a:endParaRPr lang="en-GB" sz="1600" dirty="0"/>
+          </a:p>
+        </p:txBody>
+      </p:sp>
+      <p:sp>
+        <p:nvSpPr>
+          <p:cNvPr id="5" name="Title 1">
+            <a:extLst>
+              <a:ext uri="{FF2B5EF4-FFF2-40B4-BE49-F238E27FC236}">
+                <a16:creationId xmlns:a16="http://schemas.microsoft.com/office/drawing/2014/main" id="{9C6824AB-C8AC-D81D-D26A-2212CAA2B984}"/>
+              </a:ext>
+            </a:extLst>
+          </p:cNvPr>
+          <p:cNvSpPr txBox="1">
+            <a:spLocks/>
+          </p:cNvSpPr>
+          <p:nvPr/>
+        </p:nvSpPr>
+        <p:spPr>
+          <a:xfrm>
+            <a:off x="1916382" y="6430297"/>
+            <a:ext cx="8359236" cy="427703"/>
+          </a:xfrm>
+          <a:prstGeom prst="rect">
+            <a:avLst/>
+          </a:prstGeom>
+        </p:spPr>
+        <p:txBody>
+          <a:bodyPr vert="horz" lIns="91440" tIns="45720" rIns="91440" bIns="45720" rtlCol="0" anchor="ctr">
+            <a:noAutofit/>
+          </a:bodyPr>
+          <a:lstStyle>
+            <a:lvl1pPr algn="l" defTabSz="914400" rtl="0" eaLnBrk="1" latinLnBrk="0" hangingPunct="1">
+              <a:lnSpc>
+                <a:spcPct val="85000"/>
+              </a:lnSpc>
+              <a:spcBef>
+                <a:spcPct val="0"/>
+              </a:spcBef>
+              <a:buNone/>
+              <a:defRPr sz="4800" kern="1200" spc="-50" baseline="0">
+                <a:solidFill>
+                  <a:schemeClr val="tx1">
+                    <a:lumMod val="75000"/>
+                    <a:lumOff val="25000"/>
+                  </a:schemeClr>
+                </a:solidFill>
+                <a:latin typeface="+mj-lt"/>
+                <a:ea typeface="+mj-ea"/>
+                <a:cs typeface="+mj-cs"/>
+              </a:defRPr>
+            </a:lvl1pPr>
+          </a:lstStyle>
+          <a:p>
+            <a:pPr algn="ctr"/>
+            <a:r>
+              <a:rPr lang="en-GB" sz="1800" dirty="0">
+                <a:solidFill>
+                  <a:schemeClr val="bg1"/>
+                </a:solidFill>
+              </a:rPr>
+              <a:t>Conclusion</a:t>
+            </a:r>
+          </a:p>
+        </p:txBody>
+      </p:sp>
+    </p:spTree>
+    <p:extLst>
+      <p:ext uri="{BB962C8B-B14F-4D97-AF65-F5344CB8AC3E}">
+        <p14:creationId xmlns:p14="http://schemas.microsoft.com/office/powerpoint/2010/main" val="2446263786"/>
+      </p:ext>
+    </p:extLst>
+  </p:cSld>
+  <p:clrMapOvr>
+    <a:masterClrMapping/>
+  </p:clrMapOvr>
+</p:sld>
+</file>
+
+<file path=ppt/slides/slide17.xml><?xml version="1.0" encoding="utf-8"?>
+<p:sld xmlns:a="http://schemas.openxmlformats.org/drawingml/2006/main" xmlns:r="http://schemas.openxmlformats.org/officeDocument/2006/relationships" xmlns:p="http://schemas.openxmlformats.org/presentationml/2006/main">
+  <p:cSld>
+    <p:spTree>
+      <p:nvGrpSpPr>
+        <p:cNvPr id="1" name=""/>
+        <p:cNvGrpSpPr/>
+        <p:nvPr/>
+      </p:nvGrpSpPr>
+      <p:grpSpPr>
+        <a:xfrm>
+          <a:off x="0" y="0"/>
+          <a:ext cx="0" cy="0"/>
+          <a:chOff x="0" y="0"/>
+          <a:chExt cx="0" cy="0"/>
+        </a:xfrm>
+      </p:grpSpPr>
+      <p:sp>
+        <p:nvSpPr>
+          <p:cNvPr id="2" name="Title 1">
+            <a:extLst>
+              <a:ext uri="{FF2B5EF4-FFF2-40B4-BE49-F238E27FC236}">
                 <a16:creationId xmlns:a16="http://schemas.microsoft.com/office/drawing/2014/main" id="{5DCFC5F2-DE9B-34F0-B611-397D51896824}"/>
               </a:ext>
             </a:extLst>
@@ -9169,7 +10257,7 @@
           <a:p>
             <a:fld id="{1D85C9CE-5A10-4592-9F88-5339DD41B12B}" type="slidenum">
               <a:rPr lang="en-GB" sz="1600" smtClean="0"/>
-              <a:t>16</a:t>
+              <a:t>17</a:t>
             </a:fld>
             <a:endParaRPr lang="en-GB" sz="1600" dirty="0"/>
           </a:p>
@@ -9796,7 +10884,7 @@
           <a:p>
             <a:r>
               <a:rPr lang="en-GB" dirty="0"/>
-              <a:t>Key Questions</a:t>
+              <a:t>Key Questions and Motivation</a:t>
             </a:r>
           </a:p>
         </p:txBody>
@@ -9817,14 +10905,21 @@
             <p:ph idx="1"/>
           </p:nvPr>
         </p:nvSpPr>
-        <p:spPr/>
-        <p:txBody>
-          <a:bodyPr/>
+        <p:spPr>
+          <a:xfrm>
+            <a:off x="1097280" y="1737360"/>
+            <a:ext cx="10058400" cy="4023360"/>
+          </a:xfrm>
+        </p:spPr>
+        <p:txBody>
+          <a:bodyPr>
+            <a:normAutofit/>
+          </a:bodyPr>
           <a:lstStyle/>
           <a:p>
             <a:pPr marL="457200" indent="-457200">
               <a:lnSpc>
-                <a:spcPct val="300000"/>
+                <a:spcPct val="200000"/>
               </a:lnSpc>
               <a:buFont typeface="+mj-lt"/>
               <a:buAutoNum type="arabicPeriod"/>
@@ -9837,7 +10932,7 @@
           <a:p>
             <a:pPr marL="457200" indent="-457200">
               <a:lnSpc>
-                <a:spcPct val="300000"/>
+                <a:spcPct val="200000"/>
               </a:lnSpc>
               <a:buFont typeface="+mj-lt"/>
               <a:buAutoNum type="arabicPeriod"/>
@@ -9850,7 +10945,7 @@
           <a:p>
             <a:pPr marL="457200" indent="-457200">
               <a:lnSpc>
-                <a:spcPct val="300000"/>
+                <a:spcPct val="200000"/>
               </a:lnSpc>
               <a:buFont typeface="+mj-lt"/>
               <a:buAutoNum type="arabicPeriod"/>
@@ -9950,6 +11045,141 @@
               </a:rPr>
               <a:t>Introduction</a:t>
             </a:r>
+          </a:p>
+        </p:txBody>
+      </p:sp>
+      <p:sp>
+        <p:nvSpPr>
+          <p:cNvPr id="6" name="TextBox 5">
+            <a:extLst>
+              <a:ext uri="{FF2B5EF4-FFF2-40B4-BE49-F238E27FC236}">
+                <a16:creationId xmlns:a16="http://schemas.microsoft.com/office/drawing/2014/main" id="{54C64823-0309-01C6-9D1C-9D9CBC4538F9}"/>
+              </a:ext>
+            </a:extLst>
+          </p:cNvPr>
+          <p:cNvSpPr txBox="1"/>
+          <p:nvPr/>
+        </p:nvSpPr>
+        <p:spPr>
+          <a:xfrm>
+            <a:off x="739302" y="4296881"/>
+            <a:ext cx="11060349" cy="1938992"/>
+          </a:xfrm>
+          <a:prstGeom prst="rect">
+            <a:avLst/>
+          </a:prstGeom>
+          <a:noFill/>
+        </p:spPr>
+        <p:txBody>
+          <a:bodyPr wrap="square" rtlCol="0">
+            <a:spAutoFit/>
+          </a:bodyPr>
+          <a:lstStyle/>
+          <a:p>
+            <a:pPr marL="285750" indent="-285750">
+              <a:buFont typeface="Wingdings" panose="05000000000000000000" pitchFamily="2" charset="2"/>
+              <a:buChar char="§"/>
+            </a:pPr>
+            <a:r>
+              <a:rPr lang="en-GB" dirty="0">
+                <a:solidFill>
+                  <a:schemeClr val="tx1">
+                    <a:lumMod val="75000"/>
+                    <a:lumOff val="25000"/>
+                  </a:schemeClr>
+                </a:solidFill>
+              </a:rPr>
+              <a:t>Erasmus Happiness Economics Research Organisation (EHERO) have found that good neighbourhoods and community belonging have a positive impact on life satisfaction.</a:t>
+            </a:r>
+          </a:p>
+          <a:p>
+            <a:r>
+              <a:rPr lang="en-GB" sz="1200" i="1" dirty="0">
+                <a:solidFill>
+                  <a:schemeClr val="tx1">
+                    <a:lumMod val="75000"/>
+                    <a:lumOff val="25000"/>
+                  </a:schemeClr>
+                </a:solidFill>
+                <a:hlinkClick r:id="rId2"/>
+              </a:rPr>
+              <a:t>https://networkofwellbeing.org/2017/03/16/importance-neighbourhoods-wellbeing/</a:t>
+            </a:r>
+            <a:endParaRPr lang="en-GB" sz="1200" i="1" dirty="0">
+              <a:solidFill>
+                <a:schemeClr val="tx1">
+                  <a:lumMod val="75000"/>
+                  <a:lumOff val="25000"/>
+                </a:schemeClr>
+              </a:solidFill>
+            </a:endParaRPr>
+          </a:p>
+          <a:p>
+            <a:pPr marL="171450" indent="-171450">
+              <a:buFont typeface="Wingdings" panose="05000000000000000000" pitchFamily="2" charset="2"/>
+              <a:buChar char="§"/>
+            </a:pPr>
+            <a:endParaRPr lang="en-GB" sz="1200" i="1" dirty="0">
+              <a:solidFill>
+                <a:schemeClr val="tx1">
+                  <a:lumMod val="75000"/>
+                  <a:lumOff val="25000"/>
+                </a:schemeClr>
+              </a:solidFill>
+            </a:endParaRPr>
+          </a:p>
+          <a:p>
+            <a:pPr marL="285750" indent="-285750">
+              <a:buFont typeface="Wingdings" panose="05000000000000000000" pitchFamily="2" charset="2"/>
+              <a:buChar char="§"/>
+            </a:pPr>
+            <a:r>
+              <a:rPr lang="en-GB" dirty="0">
+                <a:solidFill>
+                  <a:schemeClr val="tx1">
+                    <a:lumMod val="75000"/>
+                    <a:lumOff val="25000"/>
+                  </a:schemeClr>
+                </a:solidFill>
+              </a:rPr>
+              <a:t>The Scottish Government are also committed to empower communities and improve quality of life in neighbourhoods.</a:t>
+            </a:r>
+          </a:p>
+          <a:p>
+            <a:r>
+              <a:rPr lang="en-GB" sz="1200" i="1" dirty="0">
+                <a:solidFill>
+                  <a:schemeClr val="tx1">
+                    <a:lumMod val="75000"/>
+                    <a:lumOff val="25000"/>
+                  </a:schemeClr>
+                </a:solidFill>
+                <a:hlinkClick r:id="rId3"/>
+              </a:rPr>
+              <a:t>https://www.gov.scot/policies/community-empowerment/</a:t>
+            </a:r>
+            <a:endParaRPr lang="en-GB" sz="1200" i="1" dirty="0">
+              <a:solidFill>
+                <a:schemeClr val="tx1">
+                  <a:lumMod val="75000"/>
+                  <a:lumOff val="25000"/>
+                </a:schemeClr>
+              </a:solidFill>
+            </a:endParaRPr>
+          </a:p>
+          <a:p>
+            <a:pPr marL="171450" indent="-171450">
+              <a:buFont typeface="Wingdings" panose="05000000000000000000" pitchFamily="2" charset="2"/>
+              <a:buChar char="§"/>
+            </a:pPr>
+            <a:endParaRPr lang="en-GB" sz="1200" i="1" dirty="0">
+              <a:solidFill>
+                <a:schemeClr val="tx1">
+                  <a:lumMod val="75000"/>
+                  <a:lumOff val="25000"/>
+                </a:schemeClr>
+              </a:solidFill>
+            </a:endParaRPr>
           </a:p>
         </p:txBody>
       </p:sp>

</xml_diff>

<commit_message>
Added overview tab to app
</commit_message>
<xml_diff>
--- a/presentation/Scottish Household Survey Analysis.pptx
+++ b/presentation/Scottish Household Survey Analysis.pptx
@@ -9650,7 +9650,7 @@
           <a:p>
             <a:r>
               <a:rPr lang="en-GB" dirty="0"/>
-              <a:t>Action</a:t>
+              <a:t>Conclusion and Action</a:t>
             </a:r>
           </a:p>
         </p:txBody>
@@ -9702,7 +9702,7 @@
             </a:pPr>
             <a:r>
               <a:rPr lang="en-GB" dirty="0"/>
-              <a:t>Further investigation should also look at how neighbourhoods and communities can be improved for:</a:t>
+              <a:t>Further investigation should focus on how neighbourhoods and communities can be improved for:</a:t>
             </a:r>
           </a:p>
           <a:p>
@@ -10339,7 +10339,7 @@
 </file>
 
 <file path=ppt/slides/slide2.xml><?xml version="1.0" encoding="utf-8"?>
-<p:sld xmlns:a="http://schemas.openxmlformats.org/drawingml/2006/main" xmlns:r="http://schemas.openxmlformats.org/officeDocument/2006/relationships" xmlns:p="http://schemas.openxmlformats.org/presentationml/2006/main">
+<p:sld xmlns:a="http://schemas.openxmlformats.org/drawingml/2006/main" xmlns:r="http://schemas.openxmlformats.org/officeDocument/2006/relationships" xmlns:p="http://schemas.openxmlformats.org/presentationml/2006/main" show="0">
   <p:cSld>
     <p:spTree>
       <p:nvGrpSpPr>
@@ -10651,9 +10651,24 @@
         <p:spPr/>
         <p:txBody>
           <a:bodyPr>
-            <a:normAutofit lnSpcReduction="10000"/>
+            <a:normAutofit fontScale="92500" lnSpcReduction="20000"/>
           </a:bodyPr>
           <a:lstStyle/>
+          <a:p>
+            <a:pPr>
+              <a:buFont typeface="Wingdings" panose="05000000000000000000" pitchFamily="2" charset="2"/>
+              <a:buChar char="§"/>
+            </a:pPr>
+            <a:r>
+              <a:rPr lang="en-GB" b="1" dirty="0"/>
+              <a:t>Scottish Household Survey: </a:t>
+            </a:r>
+            <a:r>
+              <a:rPr lang="en-GB" dirty="0"/>
+              <a:t>Annual cross-sectional survey of random people in private residences across Scotland</a:t>
+            </a:r>
+            <a:endParaRPr lang="en-GB" b="1" dirty="0"/>
+          </a:p>
           <a:p>
             <a:pPr>
               <a:buFont typeface="Wingdings" panose="05000000000000000000" pitchFamily="2" charset="2"/>
@@ -11985,6 +12000,41 @@
                 </a:solidFill>
               </a:rPr>
               <a:t>Data Cleaning and Exploration</a:t>
+            </a:r>
+          </a:p>
+        </p:txBody>
+      </p:sp>
+      <p:sp>
+        <p:nvSpPr>
+          <p:cNvPr id="13" name="TextBox 12">
+            <a:extLst>
+              <a:ext uri="{FF2B5EF4-FFF2-40B4-BE49-F238E27FC236}">
+                <a16:creationId xmlns:a16="http://schemas.microsoft.com/office/drawing/2014/main" id="{5A28DC52-16EB-9DBA-A184-3E494D1B30DE}"/>
+              </a:ext>
+            </a:extLst>
+          </p:cNvPr>
+          <p:cNvSpPr txBox="1"/>
+          <p:nvPr/>
+        </p:nvSpPr>
+        <p:spPr>
+          <a:xfrm>
+            <a:off x="9987987" y="5893374"/>
+            <a:ext cx="2204013" cy="369332"/>
+          </a:xfrm>
+          <a:prstGeom prst="rect">
+            <a:avLst/>
+          </a:prstGeom>
+          <a:noFill/>
+        </p:spPr>
+        <p:txBody>
+          <a:bodyPr wrap="square" rtlCol="0">
+            <a:spAutoFit/>
+          </a:bodyPr>
+          <a:lstStyle/>
+          <a:p>
+            <a:r>
+              <a:rPr lang="en-GB" dirty="0"/>
+              <a:t>N = ~38,055 - 43,611</a:t>
             </a:r>
           </a:p>
         </p:txBody>
@@ -12230,7 +12280,7 @@
           <a:p>
             <a:r>
               <a:rPr lang="en-GB" dirty="0"/>
-              <a:t>Function to create visualisations</a:t>
+              <a:t>Create visualisations</a:t>
             </a:r>
           </a:p>
         </p:txBody>

</xml_diff>